<commit_message>
add image for the differential paths
</commit_message>
<xml_diff>
--- a/images/images.pptx
+++ b/images/images.pptx
@@ -6,6 +6,7 @@
   </p:sldMasterIdLst>
   <p:sldIdLst>
     <p:sldId id="256" r:id="rId2"/>
+    <p:sldId id="257" r:id="rId3"/>
   </p:sldIdLst>
   <p:sldSz cx="12192000" cy="6858000"/>
   <p:notesSz cx="6858000" cy="9144000"/>
@@ -104,6 +105,11 @@
       </a:defRPr>
     </a:lvl9pPr>
   </p:defaultTextStyle>
+  <p:extLst>
+    <p:ext uri="{EFAFB233-063F-42B5-8137-9DF3F51BA10A}">
+      <p15:sldGuideLst xmlns:p15="http://schemas.microsoft.com/office/powerpoint/2012/main"/>
+    </p:ext>
+  </p:extLst>
 </p:presentation>
 </file>
 
@@ -3521,8 +3527,8 @@
           </a:p>
         </p:txBody>
       </p:sp>
-      <mc:AlternateContent xmlns:mc="http://schemas.openxmlformats.org/markup-compatibility/2006">
-        <mc:Choice xmlns:a14="http://schemas.microsoft.com/office/drawing/2010/main" Requires="a14">
+      <mc:AlternateContent xmlns:mc="http://schemas.openxmlformats.org/markup-compatibility/2006" xmlns:a14="http://schemas.microsoft.com/office/drawing/2010/main">
+        <mc:Choice Requires="a14">
           <p:sp>
             <p:nvSpPr>
               <p:cNvPr id="9" name="矩形: 圆角 8">
@@ -3604,7 +3610,7 @@
             </p:txBody>
           </p:sp>
         </mc:Choice>
-        <mc:Fallback>
+        <mc:Fallback xmlns="">
           <p:sp>
             <p:nvSpPr>
               <p:cNvPr id="9" name="矩形: 圆角 8">
@@ -3741,8 +3747,8 @@
           </a:fontRef>
         </p:style>
       </p:cxnSp>
-      <mc:AlternateContent xmlns:mc="http://schemas.openxmlformats.org/markup-compatibility/2006">
-        <mc:Choice xmlns:a14="http://schemas.microsoft.com/office/drawing/2010/main" Requires="a14">
+      <mc:AlternateContent xmlns:mc="http://schemas.openxmlformats.org/markup-compatibility/2006" xmlns:a14="http://schemas.microsoft.com/office/drawing/2010/main">
+        <mc:Choice Requires="a14">
           <p:sp>
             <p:nvSpPr>
               <p:cNvPr id="17" name="矩形: 圆角 16">
@@ -3896,7 +3902,7 @@
             </p:txBody>
           </p:sp>
         </mc:Choice>
-        <mc:Fallback>
+        <mc:Fallback xmlns="">
           <p:sp>
             <p:nvSpPr>
               <p:cNvPr id="17" name="矩形: 圆角 16">
@@ -3984,8 +3990,8 @@
           </a:fontRef>
         </p:style>
       </p:cxnSp>
-      <mc:AlternateContent xmlns:mc="http://schemas.openxmlformats.org/markup-compatibility/2006">
-        <mc:Choice xmlns:a14="http://schemas.microsoft.com/office/drawing/2010/main" Requires="a14">
+      <mc:AlternateContent xmlns:mc="http://schemas.openxmlformats.org/markup-compatibility/2006" xmlns:a14="http://schemas.microsoft.com/office/drawing/2010/main">
+        <mc:Choice Requires="a14">
           <p:sp>
             <p:nvSpPr>
               <p:cNvPr id="24" name="矩形 23">
@@ -4313,7 +4319,7 @@
             </p:txBody>
           </p:sp>
         </mc:Choice>
-        <mc:Fallback>
+        <mc:Fallback xmlns="">
           <p:sp>
             <p:nvSpPr>
               <p:cNvPr id="24" name="矩形 23">
@@ -4443,8 +4449,8 @@
           </a:fontRef>
         </p:style>
       </p:cxnSp>
-      <mc:AlternateContent xmlns:mc="http://schemas.openxmlformats.org/markup-compatibility/2006">
-        <mc:Choice xmlns:a14="http://schemas.microsoft.com/office/drawing/2010/main" Requires="a14">
+      <mc:AlternateContent xmlns:mc="http://schemas.openxmlformats.org/markup-compatibility/2006" xmlns:a14="http://schemas.microsoft.com/office/drawing/2010/main">
+        <mc:Choice Requires="a14">
           <p:sp>
             <p:nvSpPr>
               <p:cNvPr id="59" name="矩形: 圆角 58">
@@ -4537,7 +4543,7 @@
             </p:txBody>
           </p:sp>
         </mc:Choice>
-        <mc:Fallback>
+        <mc:Fallback xmlns="">
           <p:sp>
             <p:nvSpPr>
               <p:cNvPr id="59" name="矩形: 圆角 58">
@@ -5263,6 +5269,1854 @@
     <p:extLst>
       <p:ext uri="{BB962C8B-B14F-4D97-AF65-F5344CB8AC3E}">
         <p14:creationId xmlns:p14="http://schemas.microsoft.com/office/powerpoint/2010/main" val="2777698680"/>
+      </p:ext>
+    </p:extLst>
+  </p:cSld>
+  <p:clrMapOvr>
+    <a:masterClrMapping/>
+  </p:clrMapOvr>
+</p:sld>
+</file>
+
+<file path=ppt/slides/slide2.xml><?xml version="1.0" encoding="utf-8"?>
+<p:sld xmlns:a="http://schemas.openxmlformats.org/drawingml/2006/main" xmlns:r="http://schemas.openxmlformats.org/officeDocument/2006/relationships" xmlns:p="http://schemas.openxmlformats.org/presentationml/2006/main">
+  <p:cSld>
+    <p:spTree>
+      <p:nvGrpSpPr>
+        <p:cNvPr id="1" name=""/>
+        <p:cNvGrpSpPr/>
+        <p:nvPr/>
+      </p:nvGrpSpPr>
+      <p:grpSpPr>
+        <a:xfrm>
+          <a:off x="0" y="0"/>
+          <a:ext cx="0" cy="0"/>
+          <a:chOff x="0" y="0"/>
+          <a:chExt cx="0" cy="0"/>
+        </a:xfrm>
+      </p:grpSpPr>
+      <p:sp>
+        <p:nvSpPr>
+          <p:cNvPr id="5" name="矩形: 圆角 4">
+            <a:extLst>
+              <a:ext uri="{FF2B5EF4-FFF2-40B4-BE49-F238E27FC236}">
+                <a16:creationId xmlns:a16="http://schemas.microsoft.com/office/drawing/2014/main" id="{E3EC1307-E87C-4D37-88D3-DD18465EA4AC}"/>
+              </a:ext>
+            </a:extLst>
+          </p:cNvPr>
+          <p:cNvSpPr/>
+          <p:nvPr/>
+        </p:nvSpPr>
+        <p:spPr>
+          <a:xfrm>
+            <a:off x="0" y="3059723"/>
+            <a:ext cx="1957754" cy="738553"/>
+          </a:xfrm>
+          <a:prstGeom prst="roundRect">
+            <a:avLst/>
+          </a:prstGeom>
+        </p:spPr>
+        <p:style>
+          <a:lnRef idx="2">
+            <a:schemeClr val="accent1">
+              <a:shade val="50000"/>
+            </a:schemeClr>
+          </a:lnRef>
+          <a:fillRef idx="1">
+            <a:schemeClr val="accent1"/>
+          </a:fillRef>
+          <a:effectRef idx="0">
+            <a:schemeClr val="accent1"/>
+          </a:effectRef>
+          <a:fontRef idx="minor">
+            <a:schemeClr val="lt1"/>
+          </a:fontRef>
+        </p:style>
+        <p:txBody>
+          <a:bodyPr rtlCol="0" anchor="ctr"/>
+          <a:lstStyle/>
+          <a:p>
+            <a:pPr algn="ctr"/>
+            <a:r>
+              <a:rPr lang="en-US" altLang="zh-CN" dirty="0"/>
+              <a:t>Initial IHV</a:t>
+            </a:r>
+            <a:endParaRPr lang="zh-CN" altLang="en-US" dirty="0"/>
+          </a:p>
+        </p:txBody>
+      </p:sp>
+      <p:sp>
+        <p:nvSpPr>
+          <p:cNvPr id="8" name="箭头: 右 7">
+            <a:extLst>
+              <a:ext uri="{FF2B5EF4-FFF2-40B4-BE49-F238E27FC236}">
+                <a16:creationId xmlns:a16="http://schemas.microsoft.com/office/drawing/2014/main" id="{C58B8A03-BF81-46FD-A045-9D0945C60C88}"/>
+              </a:ext>
+            </a:extLst>
+          </p:cNvPr>
+          <p:cNvSpPr/>
+          <p:nvPr/>
+        </p:nvSpPr>
+        <p:spPr>
+          <a:xfrm>
+            <a:off x="2735179" y="962527"/>
+            <a:ext cx="5950386" cy="1944378"/>
+          </a:xfrm>
+          <a:prstGeom prst="rightArrow">
+            <a:avLst/>
+          </a:prstGeom>
+          <a:noFill/>
+          <a:ln>
+            <a:solidFill>
+              <a:srgbClr val="4472C4"/>
+            </a:solidFill>
+          </a:ln>
+          <a:effectLst>
+            <a:glow rad="228600">
+              <a:schemeClr val="accent5">
+                <a:satMod val="175000"/>
+                <a:alpha val="40000"/>
+              </a:schemeClr>
+            </a:glow>
+          </a:effectLst>
+        </p:spPr>
+        <p:style>
+          <a:lnRef idx="2">
+            <a:schemeClr val="accent1">
+              <a:shade val="50000"/>
+            </a:schemeClr>
+          </a:lnRef>
+          <a:fillRef idx="1">
+            <a:schemeClr val="accent1"/>
+          </a:fillRef>
+          <a:effectRef idx="0">
+            <a:schemeClr val="accent1"/>
+          </a:effectRef>
+          <a:fontRef idx="minor">
+            <a:schemeClr val="lt1"/>
+          </a:fontRef>
+        </p:style>
+        <p:txBody>
+          <a:bodyPr rtlCol="0" anchor="ctr"/>
+          <a:lstStyle/>
+          <a:p>
+            <a:pPr algn="ctr"/>
+            <a:endParaRPr lang="zh-CN" altLang="en-US" dirty="0"/>
+          </a:p>
+        </p:txBody>
+      </p:sp>
+      <p:sp>
+        <p:nvSpPr>
+          <p:cNvPr id="9" name="箭头: 右 8">
+            <a:extLst>
+              <a:ext uri="{FF2B5EF4-FFF2-40B4-BE49-F238E27FC236}">
+                <a16:creationId xmlns:a16="http://schemas.microsoft.com/office/drawing/2014/main" id="{C262001A-C35C-480B-BF48-3CDCCA659F02}"/>
+              </a:ext>
+            </a:extLst>
+          </p:cNvPr>
+          <p:cNvSpPr/>
+          <p:nvPr/>
+        </p:nvSpPr>
+        <p:spPr>
+          <a:xfrm>
+            <a:off x="2735179" y="3951095"/>
+            <a:ext cx="5950386" cy="1944378"/>
+          </a:xfrm>
+          <a:prstGeom prst="rightArrow">
+            <a:avLst/>
+          </a:prstGeom>
+          <a:noFill/>
+          <a:ln>
+            <a:solidFill>
+              <a:srgbClr val="4472C4"/>
+            </a:solidFill>
+          </a:ln>
+          <a:effectLst>
+            <a:glow rad="228600">
+              <a:schemeClr val="accent5">
+                <a:satMod val="175000"/>
+                <a:alpha val="40000"/>
+              </a:schemeClr>
+            </a:glow>
+          </a:effectLst>
+        </p:spPr>
+        <p:style>
+          <a:lnRef idx="2">
+            <a:schemeClr val="accent1">
+              <a:shade val="50000"/>
+            </a:schemeClr>
+          </a:lnRef>
+          <a:fillRef idx="1">
+            <a:schemeClr val="accent1"/>
+          </a:fillRef>
+          <a:effectRef idx="0">
+            <a:schemeClr val="accent1"/>
+          </a:effectRef>
+          <a:fontRef idx="minor">
+            <a:schemeClr val="lt1"/>
+          </a:fontRef>
+        </p:style>
+        <p:txBody>
+          <a:bodyPr rtlCol="0" anchor="ctr"/>
+          <a:lstStyle/>
+          <a:p>
+            <a:pPr algn="ctr"/>
+            <a:endParaRPr lang="zh-CN" altLang="en-US"/>
+          </a:p>
+        </p:txBody>
+      </p:sp>
+      <mc:AlternateContent xmlns:mc="http://schemas.openxmlformats.org/markup-compatibility/2006">
+        <mc:Choice xmlns:a14="http://schemas.microsoft.com/office/drawing/2010/main" Requires="a14">
+          <p:sp>
+            <p:nvSpPr>
+              <p:cNvPr id="10" name="矩形 9">
+                <a:extLst>
+                  <a:ext uri="{FF2B5EF4-FFF2-40B4-BE49-F238E27FC236}">
+                    <a16:creationId xmlns:a16="http://schemas.microsoft.com/office/drawing/2014/main" id="{2A3D451E-C1EF-46E6-BDF6-39CDEB98E0EE}"/>
+                  </a:ext>
+                </a:extLst>
+              </p:cNvPr>
+              <p:cNvSpPr/>
+              <p:nvPr/>
+            </p:nvSpPr>
+            <p:spPr>
+              <a:xfrm>
+                <a:off x="2975810" y="1026695"/>
+                <a:ext cx="1852863" cy="1944378"/>
+              </a:xfrm>
+              <a:prstGeom prst="rect">
+                <a:avLst/>
+              </a:prstGeom>
+            </p:spPr>
+            <p:style>
+              <a:lnRef idx="2">
+                <a:schemeClr val="accent1">
+                  <a:shade val="50000"/>
+                </a:schemeClr>
+              </a:lnRef>
+              <a:fillRef idx="1">
+                <a:schemeClr val="accent1"/>
+              </a:fillRef>
+              <a:effectRef idx="0">
+                <a:schemeClr val="accent1"/>
+              </a:effectRef>
+              <a:fontRef idx="minor">
+                <a:schemeClr val="lt1"/>
+              </a:fontRef>
+            </p:style>
+            <p:txBody>
+              <a:bodyPr rtlCol="0" anchor="ctr"/>
+              <a:lstStyle/>
+              <a:p>
+                <a:pPr algn="ctr"/>
+                <a14:m>
+                  <m:oMathPara xmlns:m="http://schemas.openxmlformats.org/officeDocument/2006/math">
+                    <m:oMathParaPr>
+                      <m:jc m:val="centerGroup"/>
+                    </m:oMathParaPr>
+                    <m:oMath xmlns:m="http://schemas.openxmlformats.org/officeDocument/2006/math">
+                      <m:r>
+                        <a:rPr lang="en-US" altLang="zh-CN" b="0" i="1" smtClean="0">
+                          <a:latin typeface="Cambria Math" panose="02040503050406030204" pitchFamily="18" charset="0"/>
+                        </a:rPr>
+                        <m:t>𝐵𝑙𝑜𝑐</m:t>
+                      </m:r>
+                      <m:sSub>
+                        <m:sSubPr>
+                          <m:ctrlPr>
+                            <a:rPr lang="en-US" altLang="zh-CN" b="0" i="1" smtClean="0">
+                              <a:latin typeface="Cambria Math" panose="02040503050406030204" pitchFamily="18" charset="0"/>
+                            </a:rPr>
+                          </m:ctrlPr>
+                        </m:sSubPr>
+                        <m:e>
+                          <m:r>
+                            <a:rPr lang="en-US" altLang="zh-CN" b="0" i="1" smtClean="0">
+                              <a:latin typeface="Cambria Math" panose="02040503050406030204" pitchFamily="18" charset="0"/>
+                            </a:rPr>
+                            <m:t>𝑘</m:t>
+                          </m:r>
+                        </m:e>
+                        <m:sub>
+                          <m:r>
+                            <a:rPr lang="en-US" altLang="zh-CN" b="0" i="1" smtClean="0">
+                              <a:latin typeface="Cambria Math" panose="02040503050406030204" pitchFamily="18" charset="0"/>
+                            </a:rPr>
+                            <m:t>1</m:t>
+                          </m:r>
+                        </m:sub>
+                      </m:sSub>
+                    </m:oMath>
+                  </m:oMathPara>
+                </a14:m>
+                <a:endParaRPr lang="en-US" altLang="zh-CN" b="0" dirty="0"/>
+              </a:p>
+              <a:p>
+                <a:pPr algn="ctr"/>
+                <a:endParaRPr lang="en-US" altLang="zh-CN" b="0" dirty="0"/>
+              </a:p>
+              <a:p>
+                <a:pPr algn="ctr"/>
+                <a:r>
+                  <a:rPr lang="en-US" altLang="zh-CN" dirty="0"/>
+                  <a:t>Input: (</a:t>
+                </a:r>
+                <a14:m>
+                  <m:oMath xmlns:m="http://schemas.openxmlformats.org/officeDocument/2006/math">
+                    <m:sSub>
+                      <m:sSubPr>
+                        <m:ctrlPr>
+                          <a:rPr lang="en-US" altLang="zh-CN" b="0" i="1" smtClean="0">
+                            <a:latin typeface="Cambria Math" panose="02040503050406030204" pitchFamily="18" charset="0"/>
+                          </a:rPr>
+                        </m:ctrlPr>
+                      </m:sSubPr>
+                      <m:e>
+                        <m:r>
+                          <a:rPr lang="en-US" altLang="zh-CN" b="0" i="1" smtClean="0">
+                            <a:latin typeface="Cambria Math" panose="02040503050406030204" pitchFamily="18" charset="0"/>
+                          </a:rPr>
+                          <m:t>𝑚</m:t>
+                        </m:r>
+                      </m:e>
+                      <m:sub>
+                        <m:r>
+                          <a:rPr lang="en-US" altLang="zh-CN" b="0" i="1" smtClean="0">
+                            <a:latin typeface="Cambria Math" panose="02040503050406030204" pitchFamily="18" charset="0"/>
+                          </a:rPr>
+                          <m:t>1</m:t>
+                        </m:r>
+                      </m:sub>
+                    </m:sSub>
+                    <m:r>
+                      <a:rPr lang="en-US" altLang="zh-CN" b="0" i="1" smtClean="0">
+                        <a:latin typeface="Cambria Math" panose="02040503050406030204" pitchFamily="18" charset="0"/>
+                      </a:rPr>
+                      <m:t>,</m:t>
+                    </m:r>
+                    <m:r>
+                      <a:rPr lang="en-US" altLang="zh-CN" b="0" i="1" smtClean="0">
+                        <a:latin typeface="Cambria Math" panose="02040503050406030204" pitchFamily="18" charset="0"/>
+                      </a:rPr>
+                      <m:t>𝐼𝐻</m:t>
+                    </m:r>
+                    <m:sSub>
+                      <m:sSubPr>
+                        <m:ctrlPr>
+                          <a:rPr lang="en-US" altLang="zh-CN" b="0" i="1" smtClean="0">
+                            <a:latin typeface="Cambria Math" panose="02040503050406030204" pitchFamily="18" charset="0"/>
+                          </a:rPr>
+                        </m:ctrlPr>
+                      </m:sSubPr>
+                      <m:e>
+                        <m:r>
+                          <a:rPr lang="en-US" altLang="zh-CN" b="0" i="1" smtClean="0">
+                            <a:latin typeface="Cambria Math" panose="02040503050406030204" pitchFamily="18" charset="0"/>
+                          </a:rPr>
+                          <m:t>𝑉</m:t>
+                        </m:r>
+                      </m:e>
+                      <m:sub>
+                        <m:r>
+                          <a:rPr lang="en-US" altLang="zh-CN" b="0" i="1" smtClean="0">
+                            <a:latin typeface="Cambria Math" panose="02040503050406030204" pitchFamily="18" charset="0"/>
+                          </a:rPr>
+                          <m:t>𝑖𝑛</m:t>
+                        </m:r>
+                      </m:sub>
+                    </m:sSub>
+                  </m:oMath>
+                </a14:m>
+                <a:r>
+                  <a:rPr lang="en-US" altLang="zh-CN" dirty="0"/>
+                  <a:t>)</a:t>
+                </a:r>
+              </a:p>
+              <a:p>
+                <a:pPr algn="ctr"/>
+                <a:endParaRPr lang="en-US" altLang="zh-CN" dirty="0"/>
+              </a:p>
+              <a:p>
+                <a:pPr algn="ctr"/>
+                <a:r>
+                  <a:rPr lang="en-US" altLang="zh-CN" dirty="0"/>
+                  <a:t>Output: </a:t>
+                </a:r>
+                <a14:m>
+                  <m:oMath xmlns:m="http://schemas.openxmlformats.org/officeDocument/2006/math">
+                    <m:r>
+                      <a:rPr lang="en-US" altLang="zh-CN" b="0" i="1" smtClean="0">
+                        <a:latin typeface="Cambria Math" panose="02040503050406030204" pitchFamily="18" charset="0"/>
+                      </a:rPr>
+                      <m:t>𝐼𝑉</m:t>
+                    </m:r>
+                    <m:sSub>
+                      <m:sSubPr>
+                        <m:ctrlPr>
+                          <a:rPr lang="en-US" altLang="zh-CN" b="0" i="1" smtClean="0">
+                            <a:latin typeface="Cambria Math" panose="02040503050406030204" pitchFamily="18" charset="0"/>
+                          </a:rPr>
+                        </m:ctrlPr>
+                      </m:sSubPr>
+                      <m:e>
+                        <m:r>
+                          <a:rPr lang="en-US" altLang="zh-CN" b="0" i="1" smtClean="0">
+                            <a:latin typeface="Cambria Math" panose="02040503050406030204" pitchFamily="18" charset="0"/>
+                          </a:rPr>
+                          <m:t>𝐻</m:t>
+                        </m:r>
+                      </m:e>
+                      <m:sub>
+                        <m:r>
+                          <a:rPr lang="en-US" altLang="zh-CN" b="0" i="1" smtClean="0">
+                            <a:latin typeface="Cambria Math" panose="02040503050406030204" pitchFamily="18" charset="0"/>
+                          </a:rPr>
+                          <m:t>𝑜𝑢𝑡</m:t>
+                        </m:r>
+                      </m:sub>
+                    </m:sSub>
+                  </m:oMath>
+                </a14:m>
+                <a:endParaRPr lang="zh-CN" altLang="en-US" dirty="0"/>
+              </a:p>
+            </p:txBody>
+          </p:sp>
+        </mc:Choice>
+        <mc:Fallback>
+          <p:sp>
+            <p:nvSpPr>
+              <p:cNvPr id="10" name="矩形 9">
+                <a:extLst>
+                  <a:ext uri="{FF2B5EF4-FFF2-40B4-BE49-F238E27FC236}">
+                    <a16:creationId xmlns:a16="http://schemas.microsoft.com/office/drawing/2014/main" id="{2A3D451E-C1EF-46E6-BDF6-39CDEB98E0EE}"/>
+                  </a:ext>
+                </a:extLst>
+              </p:cNvPr>
+              <p:cNvSpPr>
+                <a:spLocks noRot="1" noChangeAspect="1" noMove="1" noResize="1" noEditPoints="1" noAdjustHandles="1" noChangeArrowheads="1" noChangeShapeType="1" noTextEdit="1"/>
+              </p:cNvSpPr>
+              <p:nvPr/>
+            </p:nvSpPr>
+            <p:spPr>
+              <a:xfrm>
+                <a:off x="2975810" y="1026695"/>
+                <a:ext cx="1852863" cy="1944378"/>
+              </a:xfrm>
+              <a:prstGeom prst="rect">
+                <a:avLst/>
+              </a:prstGeom>
+              <a:blipFill>
+                <a:blip r:embed="rId2"/>
+                <a:stretch>
+                  <a:fillRect l="-4248" r="-4248"/>
+                </a:stretch>
+              </a:blipFill>
+            </p:spPr>
+            <p:txBody>
+              <a:bodyPr/>
+              <a:lstStyle/>
+              <a:p>
+                <a:r>
+                  <a:rPr lang="zh-CN" altLang="en-US">
+                    <a:noFill/>
+                  </a:rPr>
+                  <a:t> </a:t>
+                </a:r>
+              </a:p>
+            </p:txBody>
+          </p:sp>
+        </mc:Fallback>
+      </mc:AlternateContent>
+      <mc:AlternateContent xmlns:mc="http://schemas.openxmlformats.org/markup-compatibility/2006">
+        <mc:Choice xmlns:a14="http://schemas.microsoft.com/office/drawing/2010/main" Requires="a14">
+          <p:sp>
+            <p:nvSpPr>
+              <p:cNvPr id="11" name="矩形 10">
+                <a:extLst>
+                  <a:ext uri="{FF2B5EF4-FFF2-40B4-BE49-F238E27FC236}">
+                    <a16:creationId xmlns:a16="http://schemas.microsoft.com/office/drawing/2014/main" id="{B96A22A1-2801-4F44-83B6-829D05447A40}"/>
+                  </a:ext>
+                </a:extLst>
+              </p:cNvPr>
+              <p:cNvSpPr/>
+              <p:nvPr/>
+            </p:nvSpPr>
+            <p:spPr>
+              <a:xfrm>
+                <a:off x="5814646" y="1026695"/>
+                <a:ext cx="1852863" cy="1944378"/>
+              </a:xfrm>
+              <a:prstGeom prst="rect">
+                <a:avLst/>
+              </a:prstGeom>
+            </p:spPr>
+            <p:style>
+              <a:lnRef idx="2">
+                <a:schemeClr val="accent1">
+                  <a:shade val="50000"/>
+                </a:schemeClr>
+              </a:lnRef>
+              <a:fillRef idx="1">
+                <a:schemeClr val="accent1"/>
+              </a:fillRef>
+              <a:effectRef idx="0">
+                <a:schemeClr val="accent1"/>
+              </a:effectRef>
+              <a:fontRef idx="minor">
+                <a:schemeClr val="lt1"/>
+              </a:fontRef>
+            </p:style>
+            <p:txBody>
+              <a:bodyPr rtlCol="0" anchor="ctr"/>
+              <a:lstStyle/>
+              <a:p>
+                <a:pPr algn="ctr"/>
+                <a14:m>
+                  <m:oMathPara xmlns:m="http://schemas.openxmlformats.org/officeDocument/2006/math">
+                    <m:oMathParaPr>
+                      <m:jc m:val="centerGroup"/>
+                    </m:oMathParaPr>
+                    <m:oMath xmlns:m="http://schemas.openxmlformats.org/officeDocument/2006/math">
+                      <m:r>
+                        <a:rPr lang="en-US" altLang="zh-CN" b="0" i="1" smtClean="0">
+                          <a:latin typeface="Cambria Math" panose="02040503050406030204" pitchFamily="18" charset="0"/>
+                        </a:rPr>
+                        <m:t>𝐵𝑙𝑜𝑐</m:t>
+                      </m:r>
+                      <m:sSub>
+                        <m:sSubPr>
+                          <m:ctrlPr>
+                            <a:rPr lang="en-US" altLang="zh-CN" b="0" i="1" smtClean="0">
+                              <a:latin typeface="Cambria Math" panose="02040503050406030204" pitchFamily="18" charset="0"/>
+                            </a:rPr>
+                          </m:ctrlPr>
+                        </m:sSubPr>
+                        <m:e>
+                          <m:r>
+                            <a:rPr lang="en-US" altLang="zh-CN" b="0" i="1" smtClean="0">
+                              <a:latin typeface="Cambria Math" panose="02040503050406030204" pitchFamily="18" charset="0"/>
+                            </a:rPr>
+                            <m:t>𝑘</m:t>
+                          </m:r>
+                        </m:e>
+                        <m:sub>
+                          <m:r>
+                            <a:rPr lang="en-US" altLang="zh-CN" b="0" i="1" smtClean="0">
+                              <a:latin typeface="Cambria Math" panose="02040503050406030204" pitchFamily="18" charset="0"/>
+                            </a:rPr>
+                            <m:t>2</m:t>
+                          </m:r>
+                        </m:sub>
+                      </m:sSub>
+                    </m:oMath>
+                  </m:oMathPara>
+                </a14:m>
+                <a:endParaRPr lang="en-US" altLang="zh-CN" dirty="0"/>
+              </a:p>
+              <a:p>
+                <a:pPr algn="ctr"/>
+                <a:endParaRPr lang="en-US" altLang="zh-CN" dirty="0"/>
+              </a:p>
+              <a:p>
+                <a:pPr algn="ctr"/>
+                <a:r>
+                  <a:rPr lang="en-US" altLang="zh-CN" dirty="0"/>
+                  <a:t>Input: (</a:t>
+                </a:r>
+                <a14:m>
+                  <m:oMath xmlns:m="http://schemas.openxmlformats.org/officeDocument/2006/math">
+                    <m:sSub>
+                      <m:sSubPr>
+                        <m:ctrlPr>
+                          <a:rPr lang="en-US" altLang="zh-CN" b="0" i="1" smtClean="0">
+                            <a:latin typeface="Cambria Math" panose="02040503050406030204" pitchFamily="18" charset="0"/>
+                          </a:rPr>
+                        </m:ctrlPr>
+                      </m:sSubPr>
+                      <m:e>
+                        <m:r>
+                          <a:rPr lang="en-US" altLang="zh-CN" b="0" i="1" smtClean="0">
+                            <a:latin typeface="Cambria Math" panose="02040503050406030204" pitchFamily="18" charset="0"/>
+                          </a:rPr>
+                          <m:t>𝑚</m:t>
+                        </m:r>
+                      </m:e>
+                      <m:sub>
+                        <m:r>
+                          <a:rPr lang="en-US" altLang="zh-CN" b="0" i="1" smtClean="0">
+                            <a:latin typeface="Cambria Math" panose="02040503050406030204" pitchFamily="18" charset="0"/>
+                          </a:rPr>
+                          <m:t>2</m:t>
+                        </m:r>
+                      </m:sub>
+                    </m:sSub>
+                    <m:r>
+                      <a:rPr lang="en-US" altLang="zh-CN" b="0" i="1" smtClean="0">
+                        <a:latin typeface="Cambria Math" panose="02040503050406030204" pitchFamily="18" charset="0"/>
+                      </a:rPr>
+                      <m:t>,</m:t>
+                    </m:r>
+                    <m:r>
+                      <a:rPr lang="en-US" altLang="zh-CN" b="0" i="1" smtClean="0">
+                        <a:latin typeface="Cambria Math" panose="02040503050406030204" pitchFamily="18" charset="0"/>
+                      </a:rPr>
+                      <m:t>𝐼𝑉</m:t>
+                    </m:r>
+                    <m:sSubSup>
+                      <m:sSubSupPr>
+                        <m:ctrlPr>
+                          <a:rPr lang="en-US" altLang="zh-CN" b="0" i="1" smtClean="0">
+                            <a:latin typeface="Cambria Math" panose="02040503050406030204" pitchFamily="18" charset="0"/>
+                          </a:rPr>
+                        </m:ctrlPr>
+                      </m:sSubSupPr>
+                      <m:e>
+                        <m:r>
+                          <a:rPr lang="en-US" altLang="zh-CN" b="0" i="1" smtClean="0">
+                            <a:latin typeface="Cambria Math" panose="02040503050406030204" pitchFamily="18" charset="0"/>
+                          </a:rPr>
+                          <m:t>𝐻</m:t>
+                        </m:r>
+                      </m:e>
+                      <m:sub>
+                        <m:r>
+                          <a:rPr lang="en-US" altLang="zh-CN" b="0" i="1" smtClean="0">
+                            <a:latin typeface="Cambria Math" panose="02040503050406030204" pitchFamily="18" charset="0"/>
+                          </a:rPr>
+                          <m:t>𝑖𝑛</m:t>
+                        </m:r>
+                      </m:sub>
+                      <m:sup>
+                        <m:r>
+                          <a:rPr lang="en-US" altLang="zh-CN" b="0" i="1" smtClean="0">
+                            <a:latin typeface="Cambria Math" panose="02040503050406030204" pitchFamily="18" charset="0"/>
+                          </a:rPr>
+                          <m:t>′</m:t>
+                        </m:r>
+                      </m:sup>
+                    </m:sSubSup>
+                  </m:oMath>
+                </a14:m>
+                <a:r>
+                  <a:rPr lang="en-US" altLang="zh-CN" dirty="0"/>
+                  <a:t>)</a:t>
+                </a:r>
+              </a:p>
+              <a:p>
+                <a:pPr algn="ctr"/>
+                <a:endParaRPr lang="en-US" altLang="zh-CN" dirty="0"/>
+              </a:p>
+              <a:p>
+                <a:pPr algn="ctr"/>
+                <a:r>
+                  <a:rPr lang="en-US" altLang="zh-CN" dirty="0"/>
+                  <a:t>Output: </a:t>
+                </a:r>
+                <a14:m>
+                  <m:oMath xmlns:m="http://schemas.openxmlformats.org/officeDocument/2006/math">
+                    <m:r>
+                      <a:rPr lang="en-US" altLang="zh-CN" b="0" i="1" smtClean="0">
+                        <a:latin typeface="Cambria Math" panose="02040503050406030204" pitchFamily="18" charset="0"/>
+                      </a:rPr>
+                      <m:t>𝐼𝑉</m:t>
+                    </m:r>
+                    <m:sSubSup>
+                      <m:sSubSupPr>
+                        <m:ctrlPr>
+                          <a:rPr lang="en-US" altLang="zh-CN" b="0" i="1" smtClean="0">
+                            <a:latin typeface="Cambria Math" panose="02040503050406030204" pitchFamily="18" charset="0"/>
+                          </a:rPr>
+                        </m:ctrlPr>
+                      </m:sSubSupPr>
+                      <m:e>
+                        <m:r>
+                          <a:rPr lang="en-US" altLang="zh-CN" b="0" i="1" smtClean="0">
+                            <a:latin typeface="Cambria Math" panose="02040503050406030204" pitchFamily="18" charset="0"/>
+                          </a:rPr>
+                          <m:t>𝐻</m:t>
+                        </m:r>
+                      </m:e>
+                      <m:sub>
+                        <m:r>
+                          <a:rPr lang="en-US" altLang="zh-CN" b="0" i="1" smtClean="0">
+                            <a:latin typeface="Cambria Math" panose="02040503050406030204" pitchFamily="18" charset="0"/>
+                          </a:rPr>
+                          <m:t>𝑜𝑢𝑡</m:t>
+                        </m:r>
+                      </m:sub>
+                      <m:sup>
+                        <m:r>
+                          <a:rPr lang="en-US" altLang="zh-CN" b="0" i="1" smtClean="0">
+                            <a:latin typeface="Cambria Math" panose="02040503050406030204" pitchFamily="18" charset="0"/>
+                          </a:rPr>
+                          <m:t>′</m:t>
+                        </m:r>
+                      </m:sup>
+                    </m:sSubSup>
+                  </m:oMath>
+                </a14:m>
+                <a:endParaRPr lang="zh-CN" altLang="en-US" dirty="0"/>
+              </a:p>
+            </p:txBody>
+          </p:sp>
+        </mc:Choice>
+        <mc:Fallback>
+          <p:sp>
+            <p:nvSpPr>
+              <p:cNvPr id="11" name="矩形 10">
+                <a:extLst>
+                  <a:ext uri="{FF2B5EF4-FFF2-40B4-BE49-F238E27FC236}">
+                    <a16:creationId xmlns:a16="http://schemas.microsoft.com/office/drawing/2014/main" id="{B96A22A1-2801-4F44-83B6-829D05447A40}"/>
+                  </a:ext>
+                </a:extLst>
+              </p:cNvPr>
+              <p:cNvSpPr>
+                <a:spLocks noRot="1" noChangeAspect="1" noMove="1" noResize="1" noEditPoints="1" noAdjustHandles="1" noChangeArrowheads="1" noChangeShapeType="1" noTextEdit="1"/>
+              </p:cNvSpPr>
+              <p:nvPr/>
+            </p:nvSpPr>
+            <p:spPr>
+              <a:xfrm>
+                <a:off x="5814646" y="1026695"/>
+                <a:ext cx="1852863" cy="1944378"/>
+              </a:xfrm>
+              <a:prstGeom prst="rect">
+                <a:avLst/>
+              </a:prstGeom>
+              <a:blipFill>
+                <a:blip r:embed="rId3"/>
+                <a:stretch>
+                  <a:fillRect l="-4248" r="-4248"/>
+                </a:stretch>
+              </a:blipFill>
+            </p:spPr>
+            <p:txBody>
+              <a:bodyPr/>
+              <a:lstStyle/>
+              <a:p>
+                <a:r>
+                  <a:rPr lang="zh-CN" altLang="en-US">
+                    <a:noFill/>
+                  </a:rPr>
+                  <a:t> </a:t>
+                </a:r>
+              </a:p>
+            </p:txBody>
+          </p:sp>
+        </mc:Fallback>
+      </mc:AlternateContent>
+      <mc:AlternateContent xmlns:mc="http://schemas.openxmlformats.org/markup-compatibility/2006">
+        <mc:Choice xmlns:a14="http://schemas.microsoft.com/office/drawing/2010/main" Requires="a14">
+          <p:sp>
+            <p:nvSpPr>
+              <p:cNvPr id="13" name="矩形 12">
+                <a:extLst>
+                  <a:ext uri="{FF2B5EF4-FFF2-40B4-BE49-F238E27FC236}">
+                    <a16:creationId xmlns:a16="http://schemas.microsoft.com/office/drawing/2014/main" id="{D144D542-A112-48A3-8EE2-5F18AD9E2072}"/>
+                  </a:ext>
+                </a:extLst>
+              </p:cNvPr>
+              <p:cNvSpPr/>
+              <p:nvPr/>
+            </p:nvSpPr>
+            <p:spPr>
+              <a:xfrm>
+                <a:off x="2975810" y="4015263"/>
+                <a:ext cx="1852863" cy="1944378"/>
+              </a:xfrm>
+              <a:prstGeom prst="rect">
+                <a:avLst/>
+              </a:prstGeom>
+            </p:spPr>
+            <p:style>
+              <a:lnRef idx="2">
+                <a:schemeClr val="accent1">
+                  <a:shade val="50000"/>
+                </a:schemeClr>
+              </a:lnRef>
+              <a:fillRef idx="1">
+                <a:schemeClr val="accent1"/>
+              </a:fillRef>
+              <a:effectRef idx="0">
+                <a:schemeClr val="accent1"/>
+              </a:effectRef>
+              <a:fontRef idx="minor">
+                <a:schemeClr val="lt1"/>
+              </a:fontRef>
+            </p:style>
+            <p:txBody>
+              <a:bodyPr rtlCol="0" anchor="ctr"/>
+              <a:lstStyle/>
+              <a:p>
+                <a:pPr algn="ctr"/>
+                <a14:m>
+                  <m:oMathPara xmlns:m="http://schemas.openxmlformats.org/officeDocument/2006/math">
+                    <m:oMathParaPr>
+                      <m:jc m:val="centerGroup"/>
+                    </m:oMathParaPr>
+                    <m:oMath xmlns:m="http://schemas.openxmlformats.org/officeDocument/2006/math">
+                      <m:r>
+                        <a:rPr lang="en-US" altLang="zh-CN" b="0" i="1" smtClean="0">
+                          <a:latin typeface="Cambria Math" panose="02040503050406030204" pitchFamily="18" charset="0"/>
+                        </a:rPr>
+                        <m:t>𝐵𝑙𝑜𝑐</m:t>
+                      </m:r>
+                      <m:sSubSup>
+                        <m:sSubSupPr>
+                          <m:ctrlPr>
+                            <a:rPr lang="en-US" altLang="zh-CN" b="0" i="1" smtClean="0">
+                              <a:latin typeface="Cambria Math" panose="02040503050406030204" pitchFamily="18" charset="0"/>
+                            </a:rPr>
+                          </m:ctrlPr>
+                        </m:sSubSupPr>
+                        <m:e>
+                          <m:r>
+                            <a:rPr lang="en-US" altLang="zh-CN" b="0" i="1" smtClean="0">
+                              <a:latin typeface="Cambria Math" panose="02040503050406030204" pitchFamily="18" charset="0"/>
+                            </a:rPr>
+                            <m:t>𝑘</m:t>
+                          </m:r>
+                        </m:e>
+                        <m:sub>
+                          <m:r>
+                            <a:rPr lang="en-US" altLang="zh-CN" b="0" i="1" smtClean="0">
+                              <a:latin typeface="Cambria Math" panose="02040503050406030204" pitchFamily="18" charset="0"/>
+                            </a:rPr>
+                            <m:t>1</m:t>
+                          </m:r>
+                        </m:sub>
+                        <m:sup>
+                          <m:r>
+                            <a:rPr lang="en-US" altLang="zh-CN" b="0" i="1" smtClean="0">
+                              <a:latin typeface="Cambria Math" panose="02040503050406030204" pitchFamily="18" charset="0"/>
+                            </a:rPr>
+                            <m:t>∗</m:t>
+                          </m:r>
+                        </m:sup>
+                      </m:sSubSup>
+                    </m:oMath>
+                  </m:oMathPara>
+                </a14:m>
+                <a:endParaRPr lang="en-US" altLang="zh-CN" b="0" dirty="0"/>
+              </a:p>
+              <a:p>
+                <a:pPr algn="ctr"/>
+                <a:endParaRPr lang="en-US" altLang="zh-CN" b="0" dirty="0"/>
+              </a:p>
+              <a:p>
+                <a:pPr algn="ctr"/>
+                <a:r>
+                  <a:rPr lang="en-US" altLang="zh-CN" dirty="0"/>
+                  <a:t>Input: (</a:t>
+                </a:r>
+                <a14:m>
+                  <m:oMath xmlns:m="http://schemas.openxmlformats.org/officeDocument/2006/math">
+                    <m:sSub>
+                      <m:sSubPr>
+                        <m:ctrlPr>
+                          <a:rPr lang="en-US" altLang="zh-CN" b="0" i="1" smtClean="0">
+                            <a:latin typeface="Cambria Math" panose="02040503050406030204" pitchFamily="18" charset="0"/>
+                          </a:rPr>
+                        </m:ctrlPr>
+                      </m:sSubPr>
+                      <m:e>
+                        <m:r>
+                          <a:rPr lang="en-US" altLang="zh-CN" b="0" i="1" smtClean="0">
+                            <a:latin typeface="Cambria Math" panose="02040503050406030204" pitchFamily="18" charset="0"/>
+                          </a:rPr>
+                          <m:t>𝑛</m:t>
+                        </m:r>
+                      </m:e>
+                      <m:sub>
+                        <m:r>
+                          <a:rPr lang="en-US" altLang="zh-CN" b="0" i="1" smtClean="0">
+                            <a:latin typeface="Cambria Math" panose="02040503050406030204" pitchFamily="18" charset="0"/>
+                          </a:rPr>
+                          <m:t>1</m:t>
+                        </m:r>
+                      </m:sub>
+                    </m:sSub>
+                    <m:r>
+                      <a:rPr lang="en-US" altLang="zh-CN" b="0" i="1" smtClean="0">
+                        <a:latin typeface="Cambria Math" panose="02040503050406030204" pitchFamily="18" charset="0"/>
+                      </a:rPr>
+                      <m:t>,</m:t>
+                    </m:r>
+                    <m:r>
+                      <a:rPr lang="en-US" altLang="zh-CN" b="0" i="1" smtClean="0">
+                        <a:latin typeface="Cambria Math" panose="02040503050406030204" pitchFamily="18" charset="0"/>
+                      </a:rPr>
+                      <m:t>𝐼𝐻</m:t>
+                    </m:r>
+                    <m:sSubSup>
+                      <m:sSubSupPr>
+                        <m:ctrlPr>
+                          <a:rPr lang="en-US" altLang="zh-CN" b="0" i="1" smtClean="0">
+                            <a:latin typeface="Cambria Math" panose="02040503050406030204" pitchFamily="18" charset="0"/>
+                          </a:rPr>
+                        </m:ctrlPr>
+                      </m:sSubSupPr>
+                      <m:e>
+                        <m:r>
+                          <a:rPr lang="en-US" altLang="zh-CN" b="0" i="1" smtClean="0">
+                            <a:latin typeface="Cambria Math" panose="02040503050406030204" pitchFamily="18" charset="0"/>
+                          </a:rPr>
+                          <m:t>𝑉</m:t>
+                        </m:r>
+                      </m:e>
+                      <m:sub>
+                        <m:r>
+                          <a:rPr lang="en-US" altLang="zh-CN" b="0" i="1" smtClean="0">
+                            <a:latin typeface="Cambria Math" panose="02040503050406030204" pitchFamily="18" charset="0"/>
+                          </a:rPr>
+                          <m:t>𝑖𝑛</m:t>
+                        </m:r>
+                      </m:sub>
+                      <m:sup>
+                        <m:r>
+                          <a:rPr lang="en-US" altLang="zh-CN" b="0" i="1" smtClean="0">
+                            <a:latin typeface="Cambria Math" panose="02040503050406030204" pitchFamily="18" charset="0"/>
+                          </a:rPr>
+                          <m:t>∗</m:t>
+                        </m:r>
+                      </m:sup>
+                    </m:sSubSup>
+                  </m:oMath>
+                </a14:m>
+                <a:r>
+                  <a:rPr lang="en-US" altLang="zh-CN" dirty="0"/>
+                  <a:t>)</a:t>
+                </a:r>
+              </a:p>
+              <a:p>
+                <a:pPr algn="ctr"/>
+                <a:endParaRPr lang="en-US" altLang="zh-CN" dirty="0"/>
+              </a:p>
+              <a:p>
+                <a:pPr algn="ctr"/>
+                <a:r>
+                  <a:rPr lang="en-US" altLang="zh-CN" dirty="0"/>
+                  <a:t>Output: </a:t>
+                </a:r>
+                <a14:m>
+                  <m:oMath xmlns:m="http://schemas.openxmlformats.org/officeDocument/2006/math">
+                    <m:r>
+                      <a:rPr lang="en-US" altLang="zh-CN" b="0" i="1" smtClean="0">
+                        <a:latin typeface="Cambria Math" panose="02040503050406030204" pitchFamily="18" charset="0"/>
+                      </a:rPr>
+                      <m:t>𝐼𝑉</m:t>
+                    </m:r>
+                    <m:sSubSup>
+                      <m:sSubSupPr>
+                        <m:ctrlPr>
+                          <a:rPr lang="en-US" altLang="zh-CN" b="0" i="1" smtClean="0">
+                            <a:latin typeface="Cambria Math" panose="02040503050406030204" pitchFamily="18" charset="0"/>
+                          </a:rPr>
+                        </m:ctrlPr>
+                      </m:sSubSupPr>
+                      <m:e>
+                        <m:r>
+                          <a:rPr lang="en-US" altLang="zh-CN" b="0" i="1" smtClean="0">
+                            <a:latin typeface="Cambria Math" panose="02040503050406030204" pitchFamily="18" charset="0"/>
+                          </a:rPr>
+                          <m:t>𝐻</m:t>
+                        </m:r>
+                      </m:e>
+                      <m:sub>
+                        <m:r>
+                          <a:rPr lang="en-US" altLang="zh-CN" b="0" i="1" smtClean="0">
+                            <a:latin typeface="Cambria Math" panose="02040503050406030204" pitchFamily="18" charset="0"/>
+                          </a:rPr>
+                          <m:t>𝑜𝑢𝑡</m:t>
+                        </m:r>
+                      </m:sub>
+                      <m:sup>
+                        <m:r>
+                          <a:rPr lang="en-US" altLang="zh-CN" b="0" i="1" smtClean="0">
+                            <a:latin typeface="Cambria Math" panose="02040503050406030204" pitchFamily="18" charset="0"/>
+                          </a:rPr>
+                          <m:t>∗</m:t>
+                        </m:r>
+                      </m:sup>
+                    </m:sSubSup>
+                  </m:oMath>
+                </a14:m>
+                <a:endParaRPr lang="zh-CN" altLang="en-US" dirty="0"/>
+              </a:p>
+            </p:txBody>
+          </p:sp>
+        </mc:Choice>
+        <mc:Fallback>
+          <p:sp>
+            <p:nvSpPr>
+              <p:cNvPr id="13" name="矩形 12">
+                <a:extLst>
+                  <a:ext uri="{FF2B5EF4-FFF2-40B4-BE49-F238E27FC236}">
+                    <a16:creationId xmlns:a16="http://schemas.microsoft.com/office/drawing/2014/main" id="{D144D542-A112-48A3-8EE2-5F18AD9E2072}"/>
+                  </a:ext>
+                </a:extLst>
+              </p:cNvPr>
+              <p:cNvSpPr>
+                <a:spLocks noRot="1" noChangeAspect="1" noMove="1" noResize="1" noEditPoints="1" noAdjustHandles="1" noChangeArrowheads="1" noChangeShapeType="1" noTextEdit="1"/>
+              </p:cNvSpPr>
+              <p:nvPr/>
+            </p:nvSpPr>
+            <p:spPr>
+              <a:xfrm>
+                <a:off x="2975810" y="4015263"/>
+                <a:ext cx="1852863" cy="1944378"/>
+              </a:xfrm>
+              <a:prstGeom prst="rect">
+                <a:avLst/>
+              </a:prstGeom>
+              <a:blipFill>
+                <a:blip r:embed="rId4"/>
+                <a:stretch>
+                  <a:fillRect l="-1307" r="-1634"/>
+                </a:stretch>
+              </a:blipFill>
+            </p:spPr>
+            <p:txBody>
+              <a:bodyPr/>
+              <a:lstStyle/>
+              <a:p>
+                <a:r>
+                  <a:rPr lang="zh-CN" altLang="en-US">
+                    <a:noFill/>
+                  </a:rPr>
+                  <a:t> </a:t>
+                </a:r>
+              </a:p>
+            </p:txBody>
+          </p:sp>
+        </mc:Fallback>
+      </mc:AlternateContent>
+      <mc:AlternateContent xmlns:mc="http://schemas.openxmlformats.org/markup-compatibility/2006">
+        <mc:Choice xmlns:a14="http://schemas.microsoft.com/office/drawing/2010/main" Requires="a14">
+          <p:sp>
+            <p:nvSpPr>
+              <p:cNvPr id="14" name="矩形 13">
+                <a:extLst>
+                  <a:ext uri="{FF2B5EF4-FFF2-40B4-BE49-F238E27FC236}">
+                    <a16:creationId xmlns:a16="http://schemas.microsoft.com/office/drawing/2014/main" id="{4652B4F2-A327-42D4-AFFA-65C205D761F7}"/>
+                  </a:ext>
+                </a:extLst>
+              </p:cNvPr>
+              <p:cNvSpPr/>
+              <p:nvPr/>
+            </p:nvSpPr>
+            <p:spPr>
+              <a:xfrm>
+                <a:off x="5814646" y="4023284"/>
+                <a:ext cx="1852863" cy="1944378"/>
+              </a:xfrm>
+              <a:prstGeom prst="rect">
+                <a:avLst/>
+              </a:prstGeom>
+            </p:spPr>
+            <p:style>
+              <a:lnRef idx="2">
+                <a:schemeClr val="accent1">
+                  <a:shade val="50000"/>
+                </a:schemeClr>
+              </a:lnRef>
+              <a:fillRef idx="1">
+                <a:schemeClr val="accent1"/>
+              </a:fillRef>
+              <a:effectRef idx="0">
+                <a:schemeClr val="accent1"/>
+              </a:effectRef>
+              <a:fontRef idx="minor">
+                <a:schemeClr val="lt1"/>
+              </a:fontRef>
+            </p:style>
+            <p:txBody>
+              <a:bodyPr rtlCol="0" anchor="ctr"/>
+              <a:lstStyle/>
+              <a:p>
+                <a:pPr algn="ctr"/>
+                <a14:m>
+                  <m:oMathPara xmlns:m="http://schemas.openxmlformats.org/officeDocument/2006/math">
+                    <m:oMathParaPr>
+                      <m:jc m:val="centerGroup"/>
+                    </m:oMathParaPr>
+                    <m:oMath xmlns:m="http://schemas.openxmlformats.org/officeDocument/2006/math">
+                      <m:r>
+                        <a:rPr lang="en-US" altLang="zh-CN" b="0" i="1" smtClean="0">
+                          <a:latin typeface="Cambria Math" panose="02040503050406030204" pitchFamily="18" charset="0"/>
+                        </a:rPr>
+                        <m:t>𝐵𝑙𝑜𝑐</m:t>
+                      </m:r>
+                      <m:sSubSup>
+                        <m:sSubSupPr>
+                          <m:ctrlPr>
+                            <a:rPr lang="en-US" altLang="zh-CN" b="0" i="1" smtClean="0">
+                              <a:latin typeface="Cambria Math" panose="02040503050406030204" pitchFamily="18" charset="0"/>
+                            </a:rPr>
+                          </m:ctrlPr>
+                        </m:sSubSupPr>
+                        <m:e>
+                          <m:r>
+                            <a:rPr lang="en-US" altLang="zh-CN" b="0" i="1" smtClean="0">
+                              <a:latin typeface="Cambria Math" panose="02040503050406030204" pitchFamily="18" charset="0"/>
+                            </a:rPr>
+                            <m:t>𝑘</m:t>
+                          </m:r>
+                        </m:e>
+                        <m:sub>
+                          <m:r>
+                            <a:rPr lang="en-US" altLang="zh-CN" b="0" i="1" smtClean="0">
+                              <a:latin typeface="Cambria Math" panose="02040503050406030204" pitchFamily="18" charset="0"/>
+                            </a:rPr>
+                            <m:t>2</m:t>
+                          </m:r>
+                        </m:sub>
+                        <m:sup>
+                          <m:r>
+                            <a:rPr lang="en-US" altLang="zh-CN" b="0" i="1" smtClean="0">
+                              <a:latin typeface="Cambria Math" panose="02040503050406030204" pitchFamily="18" charset="0"/>
+                            </a:rPr>
+                            <m:t>∗</m:t>
+                          </m:r>
+                        </m:sup>
+                      </m:sSubSup>
+                    </m:oMath>
+                  </m:oMathPara>
+                </a14:m>
+                <a:endParaRPr lang="en-US" altLang="zh-CN" b="0" dirty="0"/>
+              </a:p>
+              <a:p>
+                <a:pPr algn="ctr"/>
+                <a:endParaRPr lang="en-US" altLang="zh-CN" b="0" dirty="0"/>
+              </a:p>
+              <a:p>
+                <a:pPr algn="ctr"/>
+                <a:r>
+                  <a:rPr lang="en-US" altLang="zh-CN" dirty="0"/>
+                  <a:t>Input: (</a:t>
+                </a:r>
+                <a14:m>
+                  <m:oMath xmlns:m="http://schemas.openxmlformats.org/officeDocument/2006/math">
+                    <m:sSub>
+                      <m:sSubPr>
+                        <m:ctrlPr>
+                          <a:rPr lang="en-US" altLang="zh-CN" b="0" i="1" smtClean="0">
+                            <a:latin typeface="Cambria Math" panose="02040503050406030204" pitchFamily="18" charset="0"/>
+                          </a:rPr>
+                        </m:ctrlPr>
+                      </m:sSubPr>
+                      <m:e>
+                        <m:r>
+                          <a:rPr lang="en-US" altLang="zh-CN" b="0" i="1" smtClean="0">
+                            <a:latin typeface="Cambria Math" panose="02040503050406030204" pitchFamily="18" charset="0"/>
+                          </a:rPr>
+                          <m:t>𝑛</m:t>
+                        </m:r>
+                      </m:e>
+                      <m:sub>
+                        <m:r>
+                          <a:rPr lang="en-US" altLang="zh-CN" b="0" i="1" smtClean="0">
+                            <a:latin typeface="Cambria Math" panose="02040503050406030204" pitchFamily="18" charset="0"/>
+                          </a:rPr>
+                          <m:t>2</m:t>
+                        </m:r>
+                      </m:sub>
+                    </m:sSub>
+                    <m:r>
+                      <a:rPr lang="en-US" altLang="zh-CN" b="0" i="1" smtClean="0">
+                        <a:latin typeface="Cambria Math" panose="02040503050406030204" pitchFamily="18" charset="0"/>
+                      </a:rPr>
+                      <m:t>,</m:t>
+                    </m:r>
+                    <m:r>
+                      <a:rPr lang="en-US" altLang="zh-CN" b="0" i="1" smtClean="0">
+                        <a:latin typeface="Cambria Math" panose="02040503050406030204" pitchFamily="18" charset="0"/>
+                      </a:rPr>
+                      <m:t>𝐼𝐻</m:t>
+                    </m:r>
+                    <m:sSubSup>
+                      <m:sSubSupPr>
+                        <m:ctrlPr>
+                          <a:rPr lang="en-US" altLang="zh-CN" b="0" i="1" smtClean="0">
+                            <a:latin typeface="Cambria Math" panose="02040503050406030204" pitchFamily="18" charset="0"/>
+                          </a:rPr>
+                        </m:ctrlPr>
+                      </m:sSubSupPr>
+                      <m:e>
+                        <m:r>
+                          <a:rPr lang="en-US" altLang="zh-CN" b="0" i="1" smtClean="0">
+                            <a:latin typeface="Cambria Math" panose="02040503050406030204" pitchFamily="18" charset="0"/>
+                          </a:rPr>
+                          <m:t>𝑉</m:t>
+                        </m:r>
+                      </m:e>
+                      <m:sub>
+                        <m:r>
+                          <a:rPr lang="en-US" altLang="zh-CN" b="0" i="1" smtClean="0">
+                            <a:latin typeface="Cambria Math" panose="02040503050406030204" pitchFamily="18" charset="0"/>
+                          </a:rPr>
+                          <m:t>𝑖𝑛</m:t>
+                        </m:r>
+                      </m:sub>
+                      <m:sup>
+                        <m:r>
+                          <a:rPr lang="en-US" altLang="zh-CN" b="0" i="1" smtClean="0">
+                            <a:latin typeface="Cambria Math" panose="02040503050406030204" pitchFamily="18" charset="0"/>
+                          </a:rPr>
+                          <m:t>∗</m:t>
+                        </m:r>
+                        <m:r>
+                          <a:rPr lang="en-US" altLang="zh-CN" b="0" i="1" smtClean="0">
+                            <a:latin typeface="Cambria Math" panose="02040503050406030204" pitchFamily="18" charset="0"/>
+                          </a:rPr>
+                          <m:t>′</m:t>
+                        </m:r>
+                      </m:sup>
+                    </m:sSubSup>
+                  </m:oMath>
+                </a14:m>
+                <a:r>
+                  <a:rPr lang="en-US" altLang="zh-CN" dirty="0"/>
+                  <a:t>)</a:t>
+                </a:r>
+              </a:p>
+              <a:p>
+                <a:pPr algn="ctr"/>
+                <a:endParaRPr lang="en-US" altLang="zh-CN" dirty="0"/>
+              </a:p>
+              <a:p>
+                <a:pPr algn="ctr"/>
+                <a:r>
+                  <a:rPr lang="en-US" altLang="zh-CN" dirty="0"/>
+                  <a:t>Output: </a:t>
+                </a:r>
+                <a14:m>
+                  <m:oMath xmlns:m="http://schemas.openxmlformats.org/officeDocument/2006/math">
+                    <m:r>
+                      <a:rPr lang="en-US" altLang="zh-CN" b="0" i="1" smtClean="0">
+                        <a:latin typeface="Cambria Math" panose="02040503050406030204" pitchFamily="18" charset="0"/>
+                      </a:rPr>
+                      <m:t>𝐼𝑉</m:t>
+                    </m:r>
+                    <m:sSubSup>
+                      <m:sSubSupPr>
+                        <m:ctrlPr>
+                          <a:rPr lang="en-US" altLang="zh-CN" b="0" i="1" smtClean="0">
+                            <a:latin typeface="Cambria Math" panose="02040503050406030204" pitchFamily="18" charset="0"/>
+                          </a:rPr>
+                        </m:ctrlPr>
+                      </m:sSubSupPr>
+                      <m:e>
+                        <m:r>
+                          <a:rPr lang="en-US" altLang="zh-CN" b="0" i="1" smtClean="0">
+                            <a:latin typeface="Cambria Math" panose="02040503050406030204" pitchFamily="18" charset="0"/>
+                          </a:rPr>
+                          <m:t>𝐻</m:t>
+                        </m:r>
+                      </m:e>
+                      <m:sub>
+                        <m:r>
+                          <a:rPr lang="en-US" altLang="zh-CN" b="0" i="1" smtClean="0">
+                            <a:latin typeface="Cambria Math" panose="02040503050406030204" pitchFamily="18" charset="0"/>
+                          </a:rPr>
+                          <m:t>𝑜𝑢𝑡</m:t>
+                        </m:r>
+                      </m:sub>
+                      <m:sup>
+                        <m:r>
+                          <a:rPr lang="en-US" altLang="zh-CN" b="0" i="1" smtClean="0">
+                            <a:latin typeface="Cambria Math" panose="02040503050406030204" pitchFamily="18" charset="0"/>
+                          </a:rPr>
+                          <m:t>∗</m:t>
+                        </m:r>
+                        <m:r>
+                          <a:rPr lang="en-US" altLang="zh-CN" b="0" i="1" smtClean="0">
+                            <a:latin typeface="Cambria Math" panose="02040503050406030204" pitchFamily="18" charset="0"/>
+                          </a:rPr>
+                          <m:t>′</m:t>
+                        </m:r>
+                      </m:sup>
+                    </m:sSubSup>
+                  </m:oMath>
+                </a14:m>
+                <a:endParaRPr lang="zh-CN" altLang="en-US" dirty="0"/>
+              </a:p>
+            </p:txBody>
+          </p:sp>
+        </mc:Choice>
+        <mc:Fallback>
+          <p:sp>
+            <p:nvSpPr>
+              <p:cNvPr id="14" name="矩形 13">
+                <a:extLst>
+                  <a:ext uri="{FF2B5EF4-FFF2-40B4-BE49-F238E27FC236}">
+                    <a16:creationId xmlns:a16="http://schemas.microsoft.com/office/drawing/2014/main" id="{4652B4F2-A327-42D4-AFFA-65C205D761F7}"/>
+                  </a:ext>
+                </a:extLst>
+              </p:cNvPr>
+              <p:cNvSpPr>
+                <a:spLocks noRot="1" noChangeAspect="1" noMove="1" noResize="1" noEditPoints="1" noAdjustHandles="1" noChangeArrowheads="1" noChangeShapeType="1" noTextEdit="1"/>
+              </p:cNvSpPr>
+              <p:nvPr/>
+            </p:nvSpPr>
+            <p:spPr>
+              <a:xfrm>
+                <a:off x="5814646" y="4023284"/>
+                <a:ext cx="1852863" cy="1944378"/>
+              </a:xfrm>
+              <a:prstGeom prst="rect">
+                <a:avLst/>
+              </a:prstGeom>
+              <a:blipFill>
+                <a:blip r:embed="rId5"/>
+                <a:stretch>
+                  <a:fillRect l="-2288" r="-1634"/>
+                </a:stretch>
+              </a:blipFill>
+            </p:spPr>
+            <p:txBody>
+              <a:bodyPr/>
+              <a:lstStyle/>
+              <a:p>
+                <a:r>
+                  <a:rPr lang="zh-CN" altLang="en-US">
+                    <a:noFill/>
+                  </a:rPr>
+                  <a:t> </a:t>
+                </a:r>
+              </a:p>
+            </p:txBody>
+          </p:sp>
+        </mc:Fallback>
+      </mc:AlternateContent>
+      <mc:AlternateContent xmlns:mc="http://schemas.openxmlformats.org/markup-compatibility/2006">
+        <mc:Choice xmlns:a14="http://schemas.microsoft.com/office/drawing/2010/main" Requires="a14">
+          <p:sp>
+            <p:nvSpPr>
+              <p:cNvPr id="15" name="矩形: 圆角 14">
+                <a:extLst>
+                  <a:ext uri="{FF2B5EF4-FFF2-40B4-BE49-F238E27FC236}">
+                    <a16:creationId xmlns:a16="http://schemas.microsoft.com/office/drawing/2014/main" id="{6580F71A-4227-4DE1-87B3-E16957F84DBB}"/>
+                  </a:ext>
+                </a:extLst>
+              </p:cNvPr>
+              <p:cNvSpPr/>
+              <p:nvPr/>
+            </p:nvSpPr>
+            <p:spPr>
+              <a:xfrm>
+                <a:off x="9801726" y="3059722"/>
+                <a:ext cx="2390273" cy="738553"/>
+              </a:xfrm>
+              <a:prstGeom prst="roundRect">
+                <a:avLst/>
+              </a:prstGeom>
+            </p:spPr>
+            <p:style>
+              <a:lnRef idx="2">
+                <a:schemeClr val="accent1">
+                  <a:shade val="50000"/>
+                </a:schemeClr>
+              </a:lnRef>
+              <a:fillRef idx="1">
+                <a:schemeClr val="accent1"/>
+              </a:fillRef>
+              <a:effectRef idx="0">
+                <a:schemeClr val="accent1"/>
+              </a:effectRef>
+              <a:fontRef idx="minor">
+                <a:schemeClr val="lt1"/>
+              </a:fontRef>
+            </p:style>
+            <p:txBody>
+              <a:bodyPr rtlCol="0" anchor="ctr"/>
+              <a:lstStyle/>
+              <a:p>
+                <a:pPr algn="ctr"/>
+                <a:r>
+                  <a:rPr lang="en-US" altLang="zh-CN" dirty="0"/>
+                  <a:t>Collision!!!</a:t>
+                </a:r>
+              </a:p>
+              <a:p>
+                <a:pPr algn="ctr"/>
+                <a:r>
+                  <a:rPr lang="en-US" altLang="zh-CN" dirty="0"/>
+                  <a:t>if </a:t>
+                </a:r>
+                <a14:m>
+                  <m:oMath xmlns:m="http://schemas.openxmlformats.org/officeDocument/2006/math">
+                    <m:r>
+                      <a:rPr lang="en-US" altLang="zh-CN" b="0" i="1" smtClean="0">
+                        <a:latin typeface="Cambria Math" panose="02040503050406030204" pitchFamily="18" charset="0"/>
+                      </a:rPr>
+                      <m:t>𝐼𝑉</m:t>
+                    </m:r>
+                    <m:sSubSup>
+                      <m:sSubSupPr>
+                        <m:ctrlPr>
+                          <a:rPr lang="en-US" altLang="zh-CN" b="0" i="1" smtClean="0">
+                            <a:latin typeface="Cambria Math" panose="02040503050406030204" pitchFamily="18" charset="0"/>
+                          </a:rPr>
+                        </m:ctrlPr>
+                      </m:sSubSupPr>
+                      <m:e>
+                        <m:r>
+                          <a:rPr lang="en-US" altLang="zh-CN" b="0" i="1" smtClean="0">
+                            <a:latin typeface="Cambria Math" panose="02040503050406030204" pitchFamily="18" charset="0"/>
+                          </a:rPr>
+                          <m:t>𝐻</m:t>
+                        </m:r>
+                      </m:e>
+                      <m:sub>
+                        <m:r>
+                          <a:rPr lang="en-US" altLang="zh-CN" b="0" i="1" smtClean="0">
+                            <a:latin typeface="Cambria Math" panose="02040503050406030204" pitchFamily="18" charset="0"/>
+                          </a:rPr>
+                          <m:t>𝑜𝑢𝑡</m:t>
+                        </m:r>
+                      </m:sub>
+                      <m:sup>
+                        <m:r>
+                          <a:rPr lang="en-US" altLang="zh-CN" b="0" i="1" smtClean="0">
+                            <a:latin typeface="Cambria Math" panose="02040503050406030204" pitchFamily="18" charset="0"/>
+                          </a:rPr>
+                          <m:t>′</m:t>
+                        </m:r>
+                      </m:sup>
+                    </m:sSubSup>
+                  </m:oMath>
+                </a14:m>
+                <a:r>
+                  <a:rPr lang="en-US" altLang="zh-CN" dirty="0"/>
+                  <a:t>= </a:t>
+                </a:r>
+                <a14:m>
+                  <m:oMath xmlns:m="http://schemas.openxmlformats.org/officeDocument/2006/math">
+                    <m:r>
+                      <a:rPr lang="en-US" altLang="zh-CN" i="1">
+                        <a:latin typeface="Cambria Math" panose="02040503050406030204" pitchFamily="18" charset="0"/>
+                      </a:rPr>
+                      <m:t>𝐼𝑉</m:t>
+                    </m:r>
+                    <m:sSubSup>
+                      <m:sSubSupPr>
+                        <m:ctrlPr>
+                          <a:rPr lang="en-US" altLang="zh-CN" i="1">
+                            <a:latin typeface="Cambria Math" panose="02040503050406030204" pitchFamily="18" charset="0"/>
+                          </a:rPr>
+                        </m:ctrlPr>
+                      </m:sSubSupPr>
+                      <m:e>
+                        <m:r>
+                          <a:rPr lang="en-US" altLang="zh-CN" i="1">
+                            <a:latin typeface="Cambria Math" panose="02040503050406030204" pitchFamily="18" charset="0"/>
+                          </a:rPr>
+                          <m:t>𝐻</m:t>
+                        </m:r>
+                      </m:e>
+                      <m:sub>
+                        <m:r>
+                          <a:rPr lang="en-US" altLang="zh-CN" i="1">
+                            <a:latin typeface="Cambria Math" panose="02040503050406030204" pitchFamily="18" charset="0"/>
+                          </a:rPr>
+                          <m:t>𝑜𝑢𝑡</m:t>
+                        </m:r>
+                      </m:sub>
+                      <m:sup>
+                        <m:r>
+                          <a:rPr lang="en-US" altLang="zh-CN" i="1">
+                            <a:latin typeface="Cambria Math" panose="02040503050406030204" pitchFamily="18" charset="0"/>
+                          </a:rPr>
+                          <m:t>∗′</m:t>
+                        </m:r>
+                      </m:sup>
+                    </m:sSubSup>
+                  </m:oMath>
+                </a14:m>
+                <a:endParaRPr lang="zh-CN" altLang="en-US" dirty="0"/>
+              </a:p>
+            </p:txBody>
+          </p:sp>
+        </mc:Choice>
+        <mc:Fallback>
+          <p:sp>
+            <p:nvSpPr>
+              <p:cNvPr id="15" name="矩形: 圆角 14">
+                <a:extLst>
+                  <a:ext uri="{FF2B5EF4-FFF2-40B4-BE49-F238E27FC236}">
+                    <a16:creationId xmlns:a16="http://schemas.microsoft.com/office/drawing/2014/main" id="{6580F71A-4227-4DE1-87B3-E16957F84DBB}"/>
+                  </a:ext>
+                </a:extLst>
+              </p:cNvPr>
+              <p:cNvSpPr>
+                <a:spLocks noRot="1" noChangeAspect="1" noMove="1" noResize="1" noEditPoints="1" noAdjustHandles="1" noChangeArrowheads="1" noChangeShapeType="1" noTextEdit="1"/>
+              </p:cNvSpPr>
+              <p:nvPr/>
+            </p:nvSpPr>
+            <p:spPr>
+              <a:xfrm>
+                <a:off x="9801726" y="3059722"/>
+                <a:ext cx="2390273" cy="738553"/>
+              </a:xfrm>
+              <a:prstGeom prst="roundRect">
+                <a:avLst/>
+              </a:prstGeom>
+              <a:blipFill>
+                <a:blip r:embed="rId6"/>
+                <a:stretch>
+                  <a:fillRect b="-5691"/>
+                </a:stretch>
+              </a:blipFill>
+            </p:spPr>
+            <p:txBody>
+              <a:bodyPr/>
+              <a:lstStyle/>
+              <a:p>
+                <a:r>
+                  <a:rPr lang="zh-CN" altLang="en-US">
+                    <a:noFill/>
+                  </a:rPr>
+                  <a:t> </a:t>
+                </a:r>
+              </a:p>
+            </p:txBody>
+          </p:sp>
+        </mc:Fallback>
+      </mc:AlternateContent>
+      <p:cxnSp>
+        <p:nvCxnSpPr>
+          <p:cNvPr id="18" name="直接箭头连接符 17">
+            <a:extLst>
+              <a:ext uri="{FF2B5EF4-FFF2-40B4-BE49-F238E27FC236}">
+                <a16:creationId xmlns:a16="http://schemas.microsoft.com/office/drawing/2014/main" id="{A39A874E-6A57-4C0D-97E8-2E449A9178A8}"/>
+              </a:ext>
+            </a:extLst>
+          </p:cNvPr>
+          <p:cNvCxnSpPr>
+            <a:cxnSpLocks/>
+            <a:stCxn id="5" idx="0"/>
+            <a:endCxn id="10" idx="1"/>
+          </p:cNvCxnSpPr>
+          <p:nvPr/>
+        </p:nvCxnSpPr>
+        <p:spPr>
+          <a:xfrm flipV="1">
+            <a:off x="978877" y="1998884"/>
+            <a:ext cx="1996933" cy="1060839"/>
+          </a:xfrm>
+          <a:prstGeom prst="straightConnector1">
+            <a:avLst/>
+          </a:prstGeom>
+          <a:ln w="38100">
+            <a:tailEnd type="triangle"/>
+          </a:ln>
+        </p:spPr>
+        <p:style>
+          <a:lnRef idx="1">
+            <a:schemeClr val="accent1"/>
+          </a:lnRef>
+          <a:fillRef idx="0">
+            <a:schemeClr val="accent1"/>
+          </a:fillRef>
+          <a:effectRef idx="0">
+            <a:schemeClr val="accent1"/>
+          </a:effectRef>
+          <a:fontRef idx="minor">
+            <a:schemeClr val="tx1"/>
+          </a:fontRef>
+        </p:style>
+      </p:cxnSp>
+      <p:cxnSp>
+        <p:nvCxnSpPr>
+          <p:cNvPr id="20" name="直接箭头连接符 19">
+            <a:extLst>
+              <a:ext uri="{FF2B5EF4-FFF2-40B4-BE49-F238E27FC236}">
+                <a16:creationId xmlns:a16="http://schemas.microsoft.com/office/drawing/2014/main" id="{F93501F1-D4AB-4A78-84E4-88568A652583}"/>
+              </a:ext>
+            </a:extLst>
+          </p:cNvPr>
+          <p:cNvCxnSpPr>
+            <a:cxnSpLocks/>
+            <a:stCxn id="5" idx="2"/>
+            <a:endCxn id="13" idx="1"/>
+          </p:cNvCxnSpPr>
+          <p:nvPr/>
+        </p:nvCxnSpPr>
+        <p:spPr>
+          <a:xfrm>
+            <a:off x="978877" y="3798276"/>
+            <a:ext cx="1996933" cy="1189176"/>
+          </a:xfrm>
+          <a:prstGeom prst="straightConnector1">
+            <a:avLst/>
+          </a:prstGeom>
+          <a:ln w="38100">
+            <a:tailEnd type="triangle"/>
+          </a:ln>
+        </p:spPr>
+        <p:style>
+          <a:lnRef idx="1">
+            <a:schemeClr val="accent1"/>
+          </a:lnRef>
+          <a:fillRef idx="0">
+            <a:schemeClr val="accent1"/>
+          </a:fillRef>
+          <a:effectRef idx="0">
+            <a:schemeClr val="accent1"/>
+          </a:effectRef>
+          <a:fontRef idx="minor">
+            <a:schemeClr val="tx1"/>
+          </a:fontRef>
+        </p:style>
+      </p:cxnSp>
+      <p:cxnSp>
+        <p:nvCxnSpPr>
+          <p:cNvPr id="22" name="直接箭头连接符 21">
+            <a:extLst>
+              <a:ext uri="{FF2B5EF4-FFF2-40B4-BE49-F238E27FC236}">
+                <a16:creationId xmlns:a16="http://schemas.microsoft.com/office/drawing/2014/main" id="{A4F221C5-68D8-468E-ADCB-CDFE11DF320F}"/>
+              </a:ext>
+            </a:extLst>
+          </p:cNvPr>
+          <p:cNvCxnSpPr>
+            <a:stCxn id="10" idx="3"/>
+            <a:endCxn id="11" idx="1"/>
+          </p:cNvCxnSpPr>
+          <p:nvPr/>
+        </p:nvCxnSpPr>
+        <p:spPr>
+          <a:xfrm>
+            <a:off x="4828673" y="1998884"/>
+            <a:ext cx="985973" cy="0"/>
+          </a:xfrm>
+          <a:prstGeom prst="straightConnector1">
+            <a:avLst/>
+          </a:prstGeom>
+          <a:ln w="38100">
+            <a:tailEnd type="triangle"/>
+          </a:ln>
+        </p:spPr>
+        <p:style>
+          <a:lnRef idx="1">
+            <a:schemeClr val="accent1"/>
+          </a:lnRef>
+          <a:fillRef idx="0">
+            <a:schemeClr val="accent1"/>
+          </a:fillRef>
+          <a:effectRef idx="0">
+            <a:schemeClr val="accent1"/>
+          </a:effectRef>
+          <a:fontRef idx="minor">
+            <a:schemeClr val="tx1"/>
+          </a:fontRef>
+        </p:style>
+      </p:cxnSp>
+      <p:cxnSp>
+        <p:nvCxnSpPr>
+          <p:cNvPr id="23" name="直接箭头连接符 22">
+            <a:extLst>
+              <a:ext uri="{FF2B5EF4-FFF2-40B4-BE49-F238E27FC236}">
+                <a16:creationId xmlns:a16="http://schemas.microsoft.com/office/drawing/2014/main" id="{A56C9625-F199-4239-B6D7-98A326B0BFB9}"/>
+              </a:ext>
+            </a:extLst>
+          </p:cNvPr>
+          <p:cNvCxnSpPr>
+            <a:cxnSpLocks/>
+            <a:stCxn id="13" idx="3"/>
+            <a:endCxn id="14" idx="1"/>
+          </p:cNvCxnSpPr>
+          <p:nvPr/>
+        </p:nvCxnSpPr>
+        <p:spPr>
+          <a:xfrm>
+            <a:off x="4828673" y="4987452"/>
+            <a:ext cx="985973" cy="8021"/>
+          </a:xfrm>
+          <a:prstGeom prst="straightConnector1">
+            <a:avLst/>
+          </a:prstGeom>
+          <a:ln w="38100">
+            <a:tailEnd type="triangle"/>
+          </a:ln>
+        </p:spPr>
+        <p:style>
+          <a:lnRef idx="1">
+            <a:schemeClr val="accent1"/>
+          </a:lnRef>
+          <a:fillRef idx="0">
+            <a:schemeClr val="accent1"/>
+          </a:fillRef>
+          <a:effectRef idx="0">
+            <a:schemeClr val="accent1"/>
+          </a:effectRef>
+          <a:fontRef idx="minor">
+            <a:schemeClr val="tx1"/>
+          </a:fontRef>
+        </p:style>
+      </p:cxnSp>
+      <p:cxnSp>
+        <p:nvCxnSpPr>
+          <p:cNvPr id="26" name="直接箭头连接符 25">
+            <a:extLst>
+              <a:ext uri="{FF2B5EF4-FFF2-40B4-BE49-F238E27FC236}">
+                <a16:creationId xmlns:a16="http://schemas.microsoft.com/office/drawing/2014/main" id="{FFF96950-D333-4BDD-9EDC-E12DDF18C790}"/>
+              </a:ext>
+            </a:extLst>
+          </p:cNvPr>
+          <p:cNvCxnSpPr>
+            <a:cxnSpLocks/>
+            <a:stCxn id="11" idx="3"/>
+            <a:endCxn id="15" idx="1"/>
+          </p:cNvCxnSpPr>
+          <p:nvPr/>
+        </p:nvCxnSpPr>
+        <p:spPr>
+          <a:xfrm>
+            <a:off x="7667509" y="1998884"/>
+            <a:ext cx="2134217" cy="1430115"/>
+          </a:xfrm>
+          <a:prstGeom prst="straightConnector1">
+            <a:avLst/>
+          </a:prstGeom>
+          <a:ln w="38100">
+            <a:tailEnd type="triangle"/>
+          </a:ln>
+        </p:spPr>
+        <p:style>
+          <a:lnRef idx="1">
+            <a:schemeClr val="accent1"/>
+          </a:lnRef>
+          <a:fillRef idx="0">
+            <a:schemeClr val="accent1"/>
+          </a:fillRef>
+          <a:effectRef idx="0">
+            <a:schemeClr val="accent1"/>
+          </a:effectRef>
+          <a:fontRef idx="minor">
+            <a:schemeClr val="tx1"/>
+          </a:fontRef>
+        </p:style>
+      </p:cxnSp>
+      <p:cxnSp>
+        <p:nvCxnSpPr>
+          <p:cNvPr id="29" name="直接箭头连接符 28">
+            <a:extLst>
+              <a:ext uri="{FF2B5EF4-FFF2-40B4-BE49-F238E27FC236}">
+                <a16:creationId xmlns:a16="http://schemas.microsoft.com/office/drawing/2014/main" id="{83607990-FAFF-49D0-99B3-390958652E31}"/>
+              </a:ext>
+            </a:extLst>
+          </p:cNvPr>
+          <p:cNvCxnSpPr>
+            <a:cxnSpLocks/>
+            <a:stCxn id="14" idx="3"/>
+            <a:endCxn id="15" idx="1"/>
+          </p:cNvCxnSpPr>
+          <p:nvPr/>
+        </p:nvCxnSpPr>
+        <p:spPr>
+          <a:xfrm flipV="1">
+            <a:off x="7667509" y="3428999"/>
+            <a:ext cx="2134217" cy="1566474"/>
+          </a:xfrm>
+          <a:prstGeom prst="straightConnector1">
+            <a:avLst/>
+          </a:prstGeom>
+          <a:ln w="38100">
+            <a:tailEnd type="triangle"/>
+          </a:ln>
+        </p:spPr>
+        <p:style>
+          <a:lnRef idx="1">
+            <a:schemeClr val="accent1"/>
+          </a:lnRef>
+          <a:fillRef idx="0">
+            <a:schemeClr val="accent1"/>
+          </a:fillRef>
+          <a:effectRef idx="0">
+            <a:schemeClr val="accent1"/>
+          </a:effectRef>
+          <a:fontRef idx="minor">
+            <a:schemeClr val="tx1"/>
+          </a:fontRef>
+        </p:style>
+      </p:cxnSp>
+      <p:sp>
+        <p:nvSpPr>
+          <p:cNvPr id="38" name="文本框 37">
+            <a:extLst>
+              <a:ext uri="{FF2B5EF4-FFF2-40B4-BE49-F238E27FC236}">
+                <a16:creationId xmlns:a16="http://schemas.microsoft.com/office/drawing/2014/main" id="{C4FA3495-B089-48F7-B118-278B660AF65E}"/>
+              </a:ext>
+            </a:extLst>
+          </p:cNvPr>
+          <p:cNvSpPr txBox="1"/>
+          <p:nvPr/>
+        </p:nvSpPr>
+        <p:spPr>
+          <a:xfrm>
+            <a:off x="4345269" y="359945"/>
+            <a:ext cx="1952779" cy="369332"/>
+          </a:xfrm>
+          <a:prstGeom prst="rect">
+            <a:avLst/>
+          </a:prstGeom>
+          <a:noFill/>
+        </p:spPr>
+        <p:txBody>
+          <a:bodyPr wrap="none" rtlCol="0">
+            <a:spAutoFit/>
+          </a:bodyPr>
+          <a:lstStyle/>
+          <a:p>
+            <a:r>
+              <a:rPr lang="en-US" altLang="zh-CN" dirty="0"/>
+              <a:t>Differential Path 1</a:t>
+            </a:r>
+            <a:endParaRPr lang="zh-CN" altLang="en-US" dirty="0"/>
+          </a:p>
+        </p:txBody>
+      </p:sp>
+      <p:sp>
+        <p:nvSpPr>
+          <p:cNvPr id="39" name="文本框 38">
+            <a:extLst>
+              <a:ext uri="{FF2B5EF4-FFF2-40B4-BE49-F238E27FC236}">
+                <a16:creationId xmlns:a16="http://schemas.microsoft.com/office/drawing/2014/main" id="{0BAECE9D-7BA0-455D-84E5-CE0DD0B4CF58}"/>
+              </a:ext>
+            </a:extLst>
+          </p:cNvPr>
+          <p:cNvSpPr txBox="1"/>
+          <p:nvPr/>
+        </p:nvSpPr>
+        <p:spPr>
+          <a:xfrm>
+            <a:off x="4345269" y="6232996"/>
+            <a:ext cx="1952779" cy="369332"/>
+          </a:xfrm>
+          <a:prstGeom prst="rect">
+            <a:avLst/>
+          </a:prstGeom>
+          <a:noFill/>
+        </p:spPr>
+        <p:txBody>
+          <a:bodyPr wrap="none" rtlCol="0">
+            <a:spAutoFit/>
+          </a:bodyPr>
+          <a:lstStyle/>
+          <a:p>
+            <a:r>
+              <a:rPr lang="en-US" altLang="zh-CN" dirty="0"/>
+              <a:t>Differential Path 2</a:t>
+            </a:r>
+            <a:endParaRPr lang="zh-CN" altLang="en-US" dirty="0"/>
+          </a:p>
+        </p:txBody>
+      </p:sp>
+    </p:spTree>
+    <p:extLst>
+      <p:ext uri="{BB962C8B-B14F-4D97-AF65-F5344CB8AC3E}">
+        <p14:creationId xmlns:p14="http://schemas.microsoft.com/office/powerpoint/2010/main" val="2274933489"/>
       </p:ext>
     </p:extLst>
   </p:cSld>

</xml_diff>

<commit_message>
add images + add current report
</commit_message>
<xml_diff>
--- a/images/images.pptx
+++ b/images/images.pptx
@@ -7,6 +7,7 @@
   <p:sldIdLst>
     <p:sldId id="256" r:id="rId2"/>
     <p:sldId id="257" r:id="rId3"/>
+    <p:sldId id="258" r:id="rId4"/>
   </p:sldIdLst>
   <p:sldSz cx="12192000" cy="6858000"/>
   <p:notesSz cx="6858000" cy="9144000"/>
@@ -260,7 +261,7 @@
           <a:p>
             <a:fld id="{DE87E45F-C10E-4DA2-86AD-8ED532DAF82A}" type="datetimeFigureOut">
               <a:rPr lang="zh-CN" altLang="en-US" smtClean="0"/>
-              <a:t>2021/3/3</a:t>
+              <a:t>2021/3/8</a:t>
             </a:fld>
             <a:endParaRPr lang="zh-CN" altLang="en-US"/>
           </a:p>
@@ -458,7 +459,7 @@
           <a:p>
             <a:fld id="{DE87E45F-C10E-4DA2-86AD-8ED532DAF82A}" type="datetimeFigureOut">
               <a:rPr lang="zh-CN" altLang="en-US" smtClean="0"/>
-              <a:t>2021/3/3</a:t>
+              <a:t>2021/3/8</a:t>
             </a:fld>
             <a:endParaRPr lang="zh-CN" altLang="en-US"/>
           </a:p>
@@ -666,7 +667,7 @@
           <a:p>
             <a:fld id="{DE87E45F-C10E-4DA2-86AD-8ED532DAF82A}" type="datetimeFigureOut">
               <a:rPr lang="zh-CN" altLang="en-US" smtClean="0"/>
-              <a:t>2021/3/3</a:t>
+              <a:t>2021/3/8</a:t>
             </a:fld>
             <a:endParaRPr lang="zh-CN" altLang="en-US"/>
           </a:p>
@@ -864,7 +865,7 @@
           <a:p>
             <a:fld id="{DE87E45F-C10E-4DA2-86AD-8ED532DAF82A}" type="datetimeFigureOut">
               <a:rPr lang="zh-CN" altLang="en-US" smtClean="0"/>
-              <a:t>2021/3/3</a:t>
+              <a:t>2021/3/8</a:t>
             </a:fld>
             <a:endParaRPr lang="zh-CN" altLang="en-US"/>
           </a:p>
@@ -1139,7 +1140,7 @@
           <a:p>
             <a:fld id="{DE87E45F-C10E-4DA2-86AD-8ED532DAF82A}" type="datetimeFigureOut">
               <a:rPr lang="zh-CN" altLang="en-US" smtClean="0"/>
-              <a:t>2021/3/3</a:t>
+              <a:t>2021/3/8</a:t>
             </a:fld>
             <a:endParaRPr lang="zh-CN" altLang="en-US"/>
           </a:p>
@@ -1404,7 +1405,7 @@
           <a:p>
             <a:fld id="{DE87E45F-C10E-4DA2-86AD-8ED532DAF82A}" type="datetimeFigureOut">
               <a:rPr lang="zh-CN" altLang="en-US" smtClean="0"/>
-              <a:t>2021/3/3</a:t>
+              <a:t>2021/3/8</a:t>
             </a:fld>
             <a:endParaRPr lang="zh-CN" altLang="en-US"/>
           </a:p>
@@ -1816,7 +1817,7 @@
           <a:p>
             <a:fld id="{DE87E45F-C10E-4DA2-86AD-8ED532DAF82A}" type="datetimeFigureOut">
               <a:rPr lang="zh-CN" altLang="en-US" smtClean="0"/>
-              <a:t>2021/3/3</a:t>
+              <a:t>2021/3/8</a:t>
             </a:fld>
             <a:endParaRPr lang="zh-CN" altLang="en-US"/>
           </a:p>
@@ -1957,7 +1958,7 @@
           <a:p>
             <a:fld id="{DE87E45F-C10E-4DA2-86AD-8ED532DAF82A}" type="datetimeFigureOut">
               <a:rPr lang="zh-CN" altLang="en-US" smtClean="0"/>
-              <a:t>2021/3/3</a:t>
+              <a:t>2021/3/8</a:t>
             </a:fld>
             <a:endParaRPr lang="zh-CN" altLang="en-US"/>
           </a:p>
@@ -2070,7 +2071,7 @@
           <a:p>
             <a:fld id="{DE87E45F-C10E-4DA2-86AD-8ED532DAF82A}" type="datetimeFigureOut">
               <a:rPr lang="zh-CN" altLang="en-US" smtClean="0"/>
-              <a:t>2021/3/3</a:t>
+              <a:t>2021/3/8</a:t>
             </a:fld>
             <a:endParaRPr lang="zh-CN" altLang="en-US"/>
           </a:p>
@@ -2381,7 +2382,7 @@
           <a:p>
             <a:fld id="{DE87E45F-C10E-4DA2-86AD-8ED532DAF82A}" type="datetimeFigureOut">
               <a:rPr lang="zh-CN" altLang="en-US" smtClean="0"/>
-              <a:t>2021/3/3</a:t>
+              <a:t>2021/3/8</a:t>
             </a:fld>
             <a:endParaRPr lang="zh-CN" altLang="en-US"/>
           </a:p>
@@ -2669,7 +2670,7 @@
           <a:p>
             <a:fld id="{DE87E45F-C10E-4DA2-86AD-8ED532DAF82A}" type="datetimeFigureOut">
               <a:rPr lang="zh-CN" altLang="en-US" smtClean="0"/>
-              <a:t>2021/3/3</a:t>
+              <a:t>2021/3/8</a:t>
             </a:fld>
             <a:endParaRPr lang="zh-CN" altLang="en-US"/>
           </a:p>
@@ -2910,7 +2911,7 @@
           <a:p>
             <a:fld id="{DE87E45F-C10E-4DA2-86AD-8ED532DAF82A}" type="datetimeFigureOut">
               <a:rPr lang="zh-CN" altLang="en-US" smtClean="0"/>
-              <a:t>2021/3/3</a:t>
+              <a:t>2021/3/8</a:t>
             </a:fld>
             <a:endParaRPr lang="zh-CN" altLang="en-US"/>
           </a:p>
@@ -5465,8 +5466,8 @@
           </a:p>
         </p:txBody>
       </p:sp>
-      <mc:AlternateContent xmlns:mc="http://schemas.openxmlformats.org/markup-compatibility/2006">
-        <mc:Choice xmlns:a14="http://schemas.microsoft.com/office/drawing/2010/main" Requires="a14">
+      <mc:AlternateContent xmlns:mc="http://schemas.openxmlformats.org/markup-compatibility/2006" xmlns:a14="http://schemas.microsoft.com/office/drawing/2010/main">
+        <mc:Choice Requires="a14">
           <p:sp>
             <p:nvSpPr>
               <p:cNvPr id="10" name="矩形 9">
@@ -5648,7 +5649,7 @@
                       <a:rPr lang="en-US" altLang="zh-CN" b="0" i="1" smtClean="0">
                         <a:latin typeface="Cambria Math" panose="02040503050406030204" pitchFamily="18" charset="0"/>
                       </a:rPr>
-                      <m:t>𝐼𝑉</m:t>
+                      <m:t>𝐼𝐻</m:t>
                     </m:r>
                     <m:sSub>
                       <m:sSubPr>
@@ -5663,7 +5664,7 @@
                           <a:rPr lang="en-US" altLang="zh-CN" b="0" i="1" smtClean="0">
                             <a:latin typeface="Cambria Math" panose="02040503050406030204" pitchFamily="18" charset="0"/>
                           </a:rPr>
-                          <m:t>𝐻</m:t>
+                          <m:t>𝑉</m:t>
                         </m:r>
                       </m:e>
                       <m:sub>
@@ -5682,7 +5683,7 @@
             </p:txBody>
           </p:sp>
         </mc:Choice>
-        <mc:Fallback>
+        <mc:Fallback xmlns="">
           <p:sp>
             <p:nvSpPr>
               <p:cNvPr id="10" name="矩形 9">
@@ -5708,7 +5709,7 @@
               <a:blipFill>
                 <a:blip r:embed="rId2"/>
                 <a:stretch>
-                  <a:fillRect l="-4248" r="-4248"/>
+                  <a:fillRect l="-2288" r="-6209"/>
                 </a:stretch>
               </a:blipFill>
             </p:spPr>
@@ -5727,8 +5728,8 @@
           </p:sp>
         </mc:Fallback>
       </mc:AlternateContent>
-      <mc:AlternateContent xmlns:mc="http://schemas.openxmlformats.org/markup-compatibility/2006">
-        <mc:Choice xmlns:a14="http://schemas.microsoft.com/office/drawing/2010/main" Requires="a14">
+      <mc:AlternateContent xmlns:mc="http://schemas.openxmlformats.org/markup-compatibility/2006" xmlns:a14="http://schemas.microsoft.com/office/drawing/2010/main">
+        <mc:Choice Requires="a14">
           <p:sp>
             <p:nvSpPr>
               <p:cNvPr id="11" name="矩形 10">
@@ -5860,7 +5861,7 @@
                       <a:rPr lang="en-US" altLang="zh-CN" b="0" i="1" smtClean="0">
                         <a:latin typeface="Cambria Math" panose="02040503050406030204" pitchFamily="18" charset="0"/>
                       </a:rPr>
-                      <m:t>𝐼𝑉</m:t>
+                      <m:t>𝐼𝐻</m:t>
                     </m:r>
                     <m:sSubSup>
                       <m:sSubSupPr>
@@ -5875,7 +5876,7 @@
                           <a:rPr lang="en-US" altLang="zh-CN" b="0" i="1" smtClean="0">
                             <a:latin typeface="Cambria Math" panose="02040503050406030204" pitchFamily="18" charset="0"/>
                           </a:rPr>
-                          <m:t>𝐻</m:t>
+                          <m:t>𝑉</m:t>
                         </m:r>
                       </m:e>
                       <m:sub>
@@ -5918,7 +5919,7 @@
                       <a:rPr lang="en-US" altLang="zh-CN" b="0" i="1" smtClean="0">
                         <a:latin typeface="Cambria Math" panose="02040503050406030204" pitchFamily="18" charset="0"/>
                       </a:rPr>
-                      <m:t>𝐼𝑉</m:t>
+                      <m:t>𝐼𝐻</m:t>
                     </m:r>
                     <m:sSubSup>
                       <m:sSubSupPr>
@@ -5933,7 +5934,7 @@
                           <a:rPr lang="en-US" altLang="zh-CN" b="0" i="1" smtClean="0">
                             <a:latin typeface="Cambria Math" panose="02040503050406030204" pitchFamily="18" charset="0"/>
                           </a:rPr>
-                          <m:t>𝐻</m:t>
+                          <m:t>𝑉</m:t>
                         </m:r>
                       </m:e>
                       <m:sub>
@@ -5960,7 +5961,7 @@
             </p:txBody>
           </p:sp>
         </mc:Choice>
-        <mc:Fallback>
+        <mc:Fallback xmlns="">
           <p:sp>
             <p:nvSpPr>
               <p:cNvPr id="11" name="矩形 10">
@@ -5986,7 +5987,7 @@
               <a:blipFill>
                 <a:blip r:embed="rId3"/>
                 <a:stretch>
-                  <a:fillRect l="-4248" r="-4248"/>
+                  <a:fillRect l="-2614" r="-5882"/>
                 </a:stretch>
               </a:blipFill>
             </p:spPr>
@@ -6005,8 +6006,8 @@
           </p:sp>
         </mc:Fallback>
       </mc:AlternateContent>
-      <mc:AlternateContent xmlns:mc="http://schemas.openxmlformats.org/markup-compatibility/2006">
-        <mc:Choice xmlns:a14="http://schemas.microsoft.com/office/drawing/2010/main" Requires="a14">
+      <mc:AlternateContent xmlns:mc="http://schemas.openxmlformats.org/markup-compatibility/2006" xmlns:a14="http://schemas.microsoft.com/office/drawing/2010/main">
+        <mc:Choice Requires="a14">
           <p:sp>
             <p:nvSpPr>
               <p:cNvPr id="13" name="矩形 12">
@@ -6204,7 +6205,7 @@
                       <a:rPr lang="en-US" altLang="zh-CN" b="0" i="1" smtClean="0">
                         <a:latin typeface="Cambria Math" panose="02040503050406030204" pitchFamily="18" charset="0"/>
                       </a:rPr>
-                      <m:t>𝐼𝑉</m:t>
+                      <m:t>𝐼𝐻</m:t>
                     </m:r>
                     <m:sSubSup>
                       <m:sSubSupPr>
@@ -6219,7 +6220,7 @@
                           <a:rPr lang="en-US" altLang="zh-CN" b="0" i="1" smtClean="0">
                             <a:latin typeface="Cambria Math" panose="02040503050406030204" pitchFamily="18" charset="0"/>
                           </a:rPr>
-                          <m:t>𝐻</m:t>
+                          <m:t>𝑉</m:t>
                         </m:r>
                       </m:e>
                       <m:sub>
@@ -6246,7 +6247,7 @@
             </p:txBody>
           </p:sp>
         </mc:Choice>
-        <mc:Fallback>
+        <mc:Fallback xmlns="">
           <p:sp>
             <p:nvSpPr>
               <p:cNvPr id="13" name="矩形 12">
@@ -6291,8 +6292,8 @@
           </p:sp>
         </mc:Fallback>
       </mc:AlternateContent>
-      <mc:AlternateContent xmlns:mc="http://schemas.openxmlformats.org/markup-compatibility/2006">
-        <mc:Choice xmlns:a14="http://schemas.microsoft.com/office/drawing/2010/main" Requires="a14">
+      <mc:AlternateContent xmlns:mc="http://schemas.openxmlformats.org/markup-compatibility/2006" xmlns:a14="http://schemas.microsoft.com/office/drawing/2010/main">
+        <mc:Choice Requires="a14">
           <p:sp>
             <p:nvSpPr>
               <p:cNvPr id="14" name="矩形 13">
@@ -6463,13 +6464,7 @@
                           <a:rPr lang="en-US" altLang="zh-CN" b="0" i="1" smtClean="0">
                             <a:latin typeface="Cambria Math" panose="02040503050406030204" pitchFamily="18" charset="0"/>
                           </a:rPr>
-                          <m:t>∗</m:t>
-                        </m:r>
-                        <m:r>
-                          <a:rPr lang="en-US" altLang="zh-CN" b="0" i="1" smtClean="0">
-                            <a:latin typeface="Cambria Math" panose="02040503050406030204" pitchFamily="18" charset="0"/>
-                          </a:rPr>
-                          <m:t>′</m:t>
+                          <m:t>∗′</m:t>
                         </m:r>
                       </m:sup>
                     </m:sSubSup>
@@ -6496,7 +6491,7 @@
                       <a:rPr lang="en-US" altLang="zh-CN" b="0" i="1" smtClean="0">
                         <a:latin typeface="Cambria Math" panose="02040503050406030204" pitchFamily="18" charset="0"/>
                       </a:rPr>
-                      <m:t>𝐼𝑉</m:t>
+                      <m:t>𝐼𝐻</m:t>
                     </m:r>
                     <m:sSubSup>
                       <m:sSubSupPr>
@@ -6511,7 +6506,7 @@
                           <a:rPr lang="en-US" altLang="zh-CN" b="0" i="1" smtClean="0">
                             <a:latin typeface="Cambria Math" panose="02040503050406030204" pitchFamily="18" charset="0"/>
                           </a:rPr>
-                          <m:t>𝐻</m:t>
+                          <m:t>𝑉</m:t>
                         </m:r>
                       </m:e>
                       <m:sub>
@@ -6527,13 +6522,7 @@
                           <a:rPr lang="en-US" altLang="zh-CN" b="0" i="1" smtClean="0">
                             <a:latin typeface="Cambria Math" panose="02040503050406030204" pitchFamily="18" charset="0"/>
                           </a:rPr>
-                          <m:t>∗</m:t>
-                        </m:r>
-                        <m:r>
-                          <a:rPr lang="en-US" altLang="zh-CN" b="0" i="1" smtClean="0">
-                            <a:latin typeface="Cambria Math" panose="02040503050406030204" pitchFamily="18" charset="0"/>
-                          </a:rPr>
-                          <m:t>′</m:t>
+                          <m:t>∗′</m:t>
                         </m:r>
                       </m:sup>
                     </m:sSubSup>
@@ -6544,7 +6533,7 @@
             </p:txBody>
           </p:sp>
         </mc:Choice>
-        <mc:Fallback>
+        <mc:Fallback xmlns="">
           <p:sp>
             <p:nvSpPr>
               <p:cNvPr id="14" name="矩形 13">
@@ -6589,8 +6578,8 @@
           </p:sp>
         </mc:Fallback>
       </mc:AlternateContent>
-      <mc:AlternateContent xmlns:mc="http://schemas.openxmlformats.org/markup-compatibility/2006">
-        <mc:Choice xmlns:a14="http://schemas.microsoft.com/office/drawing/2010/main" Requires="a14">
+      <mc:AlternateContent xmlns:mc="http://schemas.openxmlformats.org/markup-compatibility/2006" xmlns:a14="http://schemas.microsoft.com/office/drawing/2010/main">
+        <mc:Choice Requires="a14">
           <p:sp>
             <p:nvSpPr>
               <p:cNvPr id="15" name="矩形: 圆角 14">
@@ -6650,7 +6639,7 @@
                       <a:rPr lang="en-US" altLang="zh-CN" b="0" i="1" smtClean="0">
                         <a:latin typeface="Cambria Math" panose="02040503050406030204" pitchFamily="18" charset="0"/>
                       </a:rPr>
-                      <m:t>𝐼𝑉</m:t>
+                      <m:t>𝐼𝐻</m:t>
                     </m:r>
                     <m:sSubSup>
                       <m:sSubSupPr>
@@ -6665,7 +6654,7 @@
                           <a:rPr lang="en-US" altLang="zh-CN" b="0" i="1" smtClean="0">
                             <a:latin typeface="Cambria Math" panose="02040503050406030204" pitchFamily="18" charset="0"/>
                           </a:rPr>
-                          <m:t>𝐻</m:t>
+                          <m:t>𝑉</m:t>
                         </m:r>
                       </m:e>
                       <m:sub>
@@ -6697,7 +6686,7 @@
                       <a:rPr lang="en-US" altLang="zh-CN" i="1">
                         <a:latin typeface="Cambria Math" panose="02040503050406030204" pitchFamily="18" charset="0"/>
                       </a:rPr>
-                      <m:t>𝐼𝑉</m:t>
+                      <m:t>𝐼</m:t>
                     </m:r>
                     <m:sSubSup>
                       <m:sSubSupPr>
@@ -6709,10 +6698,10 @@
                       </m:sSubSupPr>
                       <m:e>
                         <m:r>
-                          <a:rPr lang="en-US" altLang="zh-CN" i="1">
+                          <a:rPr lang="en-US" altLang="zh-CN" b="0" i="1" smtClean="0">
                             <a:latin typeface="Cambria Math" panose="02040503050406030204" pitchFamily="18" charset="0"/>
                           </a:rPr>
-                          <m:t>𝐻</m:t>
+                          <m:t>𝐻𝑉</m:t>
                         </m:r>
                       </m:e>
                       <m:sub>
@@ -6739,7 +6728,7 @@
             </p:txBody>
           </p:sp>
         </mc:Choice>
-        <mc:Fallback>
+        <mc:Fallback xmlns="">
           <p:sp>
             <p:nvSpPr>
               <p:cNvPr id="15" name="矩形: 圆角 14">
@@ -7117,6 +7106,1995 @@
     <p:extLst>
       <p:ext uri="{BB962C8B-B14F-4D97-AF65-F5344CB8AC3E}">
         <p14:creationId xmlns:p14="http://schemas.microsoft.com/office/powerpoint/2010/main" val="2274933489"/>
+      </p:ext>
+    </p:extLst>
+  </p:cSld>
+  <p:clrMapOvr>
+    <a:masterClrMapping/>
+  </p:clrMapOvr>
+</p:sld>
+</file>
+
+<file path=ppt/slides/slide3.xml><?xml version="1.0" encoding="utf-8"?>
+<p:sld xmlns:a="http://schemas.openxmlformats.org/drawingml/2006/main" xmlns:r="http://schemas.openxmlformats.org/officeDocument/2006/relationships" xmlns:p="http://schemas.openxmlformats.org/presentationml/2006/main">
+  <p:cSld>
+    <p:spTree>
+      <p:nvGrpSpPr>
+        <p:cNvPr id="1" name=""/>
+        <p:cNvGrpSpPr/>
+        <p:nvPr/>
+      </p:nvGrpSpPr>
+      <p:grpSpPr>
+        <a:xfrm>
+          <a:off x="0" y="0"/>
+          <a:ext cx="0" cy="0"/>
+          <a:chOff x="0" y="0"/>
+          <a:chExt cx="0" cy="0"/>
+        </a:xfrm>
+      </p:grpSpPr>
+      <mc:AlternateContent xmlns:mc="http://schemas.openxmlformats.org/markup-compatibility/2006" xmlns:a14="http://schemas.microsoft.com/office/drawing/2010/main">
+        <mc:Choice Requires="a14">
+          <p:sp>
+            <p:nvSpPr>
+              <p:cNvPr id="4" name="矩形: 圆角 3">
+                <a:extLst>
+                  <a:ext uri="{FF2B5EF4-FFF2-40B4-BE49-F238E27FC236}">
+                    <a16:creationId xmlns:a16="http://schemas.microsoft.com/office/drawing/2014/main" id="{21AD9A8C-62D4-49F9-9DCE-C73D0232A0F7}"/>
+                  </a:ext>
+                </a:extLst>
+              </p:cNvPr>
+              <p:cNvSpPr/>
+              <p:nvPr/>
+            </p:nvSpPr>
+            <p:spPr>
+              <a:xfrm>
+                <a:off x="1786358" y="3047038"/>
+                <a:ext cx="1458411" cy="763929"/>
+              </a:xfrm>
+              <a:prstGeom prst="roundRect">
+                <a:avLst/>
+              </a:prstGeom>
+            </p:spPr>
+            <p:style>
+              <a:lnRef idx="2">
+                <a:schemeClr val="accent1">
+                  <a:shade val="50000"/>
+                </a:schemeClr>
+              </a:lnRef>
+              <a:fillRef idx="1">
+                <a:schemeClr val="accent1"/>
+              </a:fillRef>
+              <a:effectRef idx="0">
+                <a:schemeClr val="accent1"/>
+              </a:effectRef>
+              <a:fontRef idx="minor">
+                <a:schemeClr val="lt1"/>
+              </a:fontRef>
+            </p:style>
+            <p:txBody>
+              <a:bodyPr rtlCol="0" anchor="ctr"/>
+              <a:lstStyle/>
+              <a:p>
+                <a:pPr algn="ctr"/>
+                <a14:m>
+                  <m:oMath xmlns:m="http://schemas.openxmlformats.org/officeDocument/2006/math">
+                    <m:sSup>
+                      <m:sSupPr>
+                        <m:ctrlPr>
+                          <a:rPr lang="en-US" altLang="zh-CN" b="0" i="1" smtClean="0">
+                            <a:latin typeface="Cambria Math" panose="02040503050406030204" pitchFamily="18" charset="0"/>
+                          </a:rPr>
+                        </m:ctrlPr>
+                      </m:sSupPr>
+                      <m:e>
+                        <m:r>
+                          <a:rPr lang="en-US" altLang="zh-CN" b="0" i="1" smtClean="0">
+                            <a:latin typeface="Cambria Math" panose="02040503050406030204" pitchFamily="18" charset="0"/>
+                          </a:rPr>
+                          <m:t>1</m:t>
+                        </m:r>
+                      </m:e>
+                      <m:sup>
+                        <m:r>
+                          <a:rPr lang="en-US" altLang="zh-CN" b="0" i="1" smtClean="0">
+                            <a:latin typeface="Cambria Math" panose="02040503050406030204" pitchFamily="18" charset="0"/>
+                          </a:rPr>
+                          <m:t>𝑠𝑡</m:t>
+                        </m:r>
+                      </m:sup>
+                    </m:sSup>
+                  </m:oMath>
+                </a14:m>
+                <a:r>
+                  <a:rPr lang="zh-CN" altLang="en-US" dirty="0"/>
+                  <a:t> </a:t>
+                </a:r>
+                <a:r>
+                  <a:rPr lang="en-US" altLang="zh-CN" dirty="0"/>
+                  <a:t>Block</a:t>
+                </a:r>
+                <a:endParaRPr lang="zh-CN" altLang="en-US" dirty="0"/>
+              </a:p>
+            </p:txBody>
+          </p:sp>
+        </mc:Choice>
+        <mc:Fallback xmlns="">
+          <p:sp>
+            <p:nvSpPr>
+              <p:cNvPr id="4" name="矩形: 圆角 3">
+                <a:extLst>
+                  <a:ext uri="{FF2B5EF4-FFF2-40B4-BE49-F238E27FC236}">
+                    <a16:creationId xmlns:a16="http://schemas.microsoft.com/office/drawing/2014/main" id="{21AD9A8C-62D4-49F9-9DCE-C73D0232A0F7}"/>
+                  </a:ext>
+                </a:extLst>
+              </p:cNvPr>
+              <p:cNvSpPr>
+                <a:spLocks noRot="1" noChangeAspect="1" noMove="1" noResize="1" noEditPoints="1" noAdjustHandles="1" noChangeArrowheads="1" noChangeShapeType="1" noTextEdit="1"/>
+              </p:cNvSpPr>
+              <p:nvPr/>
+            </p:nvSpPr>
+            <p:spPr>
+              <a:xfrm>
+                <a:off x="1786358" y="3047038"/>
+                <a:ext cx="1458411" cy="763929"/>
+              </a:xfrm>
+              <a:prstGeom prst="roundRect">
+                <a:avLst/>
+              </a:prstGeom>
+              <a:blipFill>
+                <a:blip r:embed="rId2"/>
+                <a:stretch>
+                  <a:fillRect/>
+                </a:stretch>
+              </a:blipFill>
+            </p:spPr>
+            <p:txBody>
+              <a:bodyPr/>
+              <a:lstStyle/>
+              <a:p>
+                <a:r>
+                  <a:rPr lang="zh-CN" altLang="en-US">
+                    <a:noFill/>
+                  </a:rPr>
+                  <a:t> </a:t>
+                </a:r>
+              </a:p>
+            </p:txBody>
+          </p:sp>
+        </mc:Fallback>
+      </mc:AlternateContent>
+      <mc:AlternateContent xmlns:mc="http://schemas.openxmlformats.org/markup-compatibility/2006" xmlns:a14="http://schemas.microsoft.com/office/drawing/2010/main">
+        <mc:Choice Requires="a14">
+          <p:sp>
+            <p:nvSpPr>
+              <p:cNvPr id="5" name="矩形: 圆角 4">
+                <a:extLst>
+                  <a:ext uri="{FF2B5EF4-FFF2-40B4-BE49-F238E27FC236}">
+                    <a16:creationId xmlns:a16="http://schemas.microsoft.com/office/drawing/2014/main" id="{8753EB64-CFD9-48CC-B137-65396368F566}"/>
+                  </a:ext>
+                </a:extLst>
+              </p:cNvPr>
+              <p:cNvSpPr/>
+              <p:nvPr/>
+            </p:nvSpPr>
+            <p:spPr>
+              <a:xfrm>
+                <a:off x="3941179" y="3047038"/>
+                <a:ext cx="1458411" cy="763929"/>
+              </a:xfrm>
+              <a:prstGeom prst="roundRect">
+                <a:avLst/>
+              </a:prstGeom>
+            </p:spPr>
+            <p:style>
+              <a:lnRef idx="2">
+                <a:schemeClr val="accent1">
+                  <a:shade val="50000"/>
+                </a:schemeClr>
+              </a:lnRef>
+              <a:fillRef idx="1">
+                <a:schemeClr val="accent1"/>
+              </a:fillRef>
+              <a:effectRef idx="0">
+                <a:schemeClr val="accent1"/>
+              </a:effectRef>
+              <a:fontRef idx="minor">
+                <a:schemeClr val="lt1"/>
+              </a:fontRef>
+            </p:style>
+            <p:txBody>
+              <a:bodyPr rtlCol="0" anchor="ctr"/>
+              <a:lstStyle/>
+              <a:p>
+                <a:pPr algn="ctr"/>
+                <a14:m>
+                  <m:oMath xmlns:m="http://schemas.openxmlformats.org/officeDocument/2006/math">
+                    <m:sSup>
+                      <m:sSupPr>
+                        <m:ctrlPr>
+                          <a:rPr lang="en-US" altLang="zh-CN" b="0" i="1" smtClean="0">
+                            <a:latin typeface="Cambria Math" panose="02040503050406030204" pitchFamily="18" charset="0"/>
+                          </a:rPr>
+                        </m:ctrlPr>
+                      </m:sSupPr>
+                      <m:e>
+                        <m:r>
+                          <a:rPr lang="en-US" altLang="zh-CN" b="0" i="1" smtClean="0">
+                            <a:latin typeface="Cambria Math" panose="02040503050406030204" pitchFamily="18" charset="0"/>
+                          </a:rPr>
+                          <m:t>2</m:t>
+                        </m:r>
+                      </m:e>
+                      <m:sup>
+                        <m:r>
+                          <a:rPr lang="en-US" altLang="zh-CN" b="0" i="1" smtClean="0">
+                            <a:latin typeface="Cambria Math" panose="02040503050406030204" pitchFamily="18" charset="0"/>
+                          </a:rPr>
+                          <m:t>𝑛𝑑</m:t>
+                        </m:r>
+                      </m:sup>
+                    </m:sSup>
+                  </m:oMath>
+                </a14:m>
+                <a:r>
+                  <a:rPr lang="zh-CN" altLang="en-US" dirty="0"/>
+                  <a:t> </a:t>
+                </a:r>
+                <a:r>
+                  <a:rPr lang="en-US" altLang="zh-CN" dirty="0"/>
+                  <a:t>Block</a:t>
+                </a:r>
+                <a:endParaRPr lang="zh-CN" altLang="en-US" dirty="0"/>
+              </a:p>
+            </p:txBody>
+          </p:sp>
+        </mc:Choice>
+        <mc:Fallback xmlns="">
+          <p:sp>
+            <p:nvSpPr>
+              <p:cNvPr id="5" name="矩形: 圆角 4">
+                <a:extLst>
+                  <a:ext uri="{FF2B5EF4-FFF2-40B4-BE49-F238E27FC236}">
+                    <a16:creationId xmlns:a16="http://schemas.microsoft.com/office/drawing/2014/main" id="{8753EB64-CFD9-48CC-B137-65396368F566}"/>
+                  </a:ext>
+                </a:extLst>
+              </p:cNvPr>
+              <p:cNvSpPr>
+                <a:spLocks noRot="1" noChangeAspect="1" noMove="1" noResize="1" noEditPoints="1" noAdjustHandles="1" noChangeArrowheads="1" noChangeShapeType="1" noTextEdit="1"/>
+              </p:cNvSpPr>
+              <p:nvPr/>
+            </p:nvSpPr>
+            <p:spPr>
+              <a:xfrm>
+                <a:off x="3941179" y="3047038"/>
+                <a:ext cx="1458411" cy="763929"/>
+              </a:xfrm>
+              <a:prstGeom prst="roundRect">
+                <a:avLst/>
+              </a:prstGeom>
+              <a:blipFill>
+                <a:blip r:embed="rId3"/>
+                <a:stretch>
+                  <a:fillRect/>
+                </a:stretch>
+              </a:blipFill>
+            </p:spPr>
+            <p:txBody>
+              <a:bodyPr/>
+              <a:lstStyle/>
+              <a:p>
+                <a:r>
+                  <a:rPr lang="zh-CN" altLang="en-US">
+                    <a:noFill/>
+                  </a:rPr>
+                  <a:t> </a:t>
+                </a:r>
+              </a:p>
+            </p:txBody>
+          </p:sp>
+        </mc:Fallback>
+      </mc:AlternateContent>
+      <mc:AlternateContent xmlns:mc="http://schemas.openxmlformats.org/markup-compatibility/2006" xmlns:a14="http://schemas.microsoft.com/office/drawing/2010/main">
+        <mc:Choice Requires="a14">
+          <p:sp>
+            <p:nvSpPr>
+              <p:cNvPr id="6" name="矩形: 圆角 5">
+                <a:extLst>
+                  <a:ext uri="{FF2B5EF4-FFF2-40B4-BE49-F238E27FC236}">
+                    <a16:creationId xmlns:a16="http://schemas.microsoft.com/office/drawing/2014/main" id="{DC1184C7-1E10-4933-8A14-24BC3C2ECF95}"/>
+                  </a:ext>
+                </a:extLst>
+              </p:cNvPr>
+              <p:cNvSpPr/>
+              <p:nvPr/>
+            </p:nvSpPr>
+            <p:spPr>
+              <a:xfrm>
+                <a:off x="6096000" y="3047035"/>
+                <a:ext cx="1458411" cy="763929"/>
+              </a:xfrm>
+              <a:prstGeom prst="roundRect">
+                <a:avLst/>
+              </a:prstGeom>
+            </p:spPr>
+            <p:style>
+              <a:lnRef idx="2">
+                <a:schemeClr val="accent1">
+                  <a:shade val="50000"/>
+                </a:schemeClr>
+              </a:lnRef>
+              <a:fillRef idx="1">
+                <a:schemeClr val="accent1"/>
+              </a:fillRef>
+              <a:effectRef idx="0">
+                <a:schemeClr val="accent1"/>
+              </a:effectRef>
+              <a:fontRef idx="minor">
+                <a:schemeClr val="lt1"/>
+              </a:fontRef>
+            </p:style>
+            <p:txBody>
+              <a:bodyPr rtlCol="0" anchor="ctr"/>
+              <a:lstStyle/>
+              <a:p>
+                <a:pPr algn="ctr"/>
+                <a14:m>
+                  <m:oMath xmlns:m="http://schemas.openxmlformats.org/officeDocument/2006/math">
+                    <m:sSup>
+                      <m:sSupPr>
+                        <m:ctrlPr>
+                          <a:rPr lang="en-US" altLang="zh-CN" b="0" i="1" smtClean="0">
+                            <a:latin typeface="Cambria Math" panose="02040503050406030204" pitchFamily="18" charset="0"/>
+                          </a:rPr>
+                        </m:ctrlPr>
+                      </m:sSupPr>
+                      <m:e>
+                        <m:r>
+                          <a:rPr lang="en-US" altLang="zh-CN" b="0" i="1" smtClean="0">
+                            <a:latin typeface="Cambria Math" panose="02040503050406030204" pitchFamily="18" charset="0"/>
+                          </a:rPr>
+                          <m:t>3</m:t>
+                        </m:r>
+                      </m:e>
+                      <m:sup>
+                        <m:r>
+                          <a:rPr lang="en-US" altLang="zh-CN" b="0" i="1" smtClean="0">
+                            <a:latin typeface="Cambria Math" panose="02040503050406030204" pitchFamily="18" charset="0"/>
+                          </a:rPr>
+                          <m:t>𝑟𝑑</m:t>
+                        </m:r>
+                      </m:sup>
+                    </m:sSup>
+                  </m:oMath>
+                </a14:m>
+                <a:r>
+                  <a:rPr lang="zh-CN" altLang="en-US" dirty="0"/>
+                  <a:t> </a:t>
+                </a:r>
+                <a:r>
+                  <a:rPr lang="en-US" altLang="zh-CN" dirty="0"/>
+                  <a:t>Block</a:t>
+                </a:r>
+                <a:endParaRPr lang="zh-CN" altLang="en-US" dirty="0"/>
+              </a:p>
+            </p:txBody>
+          </p:sp>
+        </mc:Choice>
+        <mc:Fallback xmlns="">
+          <p:sp>
+            <p:nvSpPr>
+              <p:cNvPr id="6" name="矩形: 圆角 5">
+                <a:extLst>
+                  <a:ext uri="{FF2B5EF4-FFF2-40B4-BE49-F238E27FC236}">
+                    <a16:creationId xmlns:a16="http://schemas.microsoft.com/office/drawing/2014/main" id="{DC1184C7-1E10-4933-8A14-24BC3C2ECF95}"/>
+                  </a:ext>
+                </a:extLst>
+              </p:cNvPr>
+              <p:cNvSpPr>
+                <a:spLocks noRot="1" noChangeAspect="1" noMove="1" noResize="1" noEditPoints="1" noAdjustHandles="1" noChangeArrowheads="1" noChangeShapeType="1" noTextEdit="1"/>
+              </p:cNvSpPr>
+              <p:nvPr/>
+            </p:nvSpPr>
+            <p:spPr>
+              <a:xfrm>
+                <a:off x="6096000" y="3047035"/>
+                <a:ext cx="1458411" cy="763929"/>
+              </a:xfrm>
+              <a:prstGeom prst="roundRect">
+                <a:avLst/>
+              </a:prstGeom>
+              <a:blipFill>
+                <a:blip r:embed="rId4"/>
+                <a:stretch>
+                  <a:fillRect/>
+                </a:stretch>
+              </a:blipFill>
+            </p:spPr>
+            <p:txBody>
+              <a:bodyPr/>
+              <a:lstStyle/>
+              <a:p>
+                <a:r>
+                  <a:rPr lang="zh-CN" altLang="en-US">
+                    <a:noFill/>
+                  </a:rPr>
+                  <a:t> </a:t>
+                </a:r>
+              </a:p>
+            </p:txBody>
+          </p:sp>
+        </mc:Fallback>
+      </mc:AlternateContent>
+      <mc:AlternateContent xmlns:mc="http://schemas.openxmlformats.org/markup-compatibility/2006" xmlns:a14="http://schemas.microsoft.com/office/drawing/2010/main">
+        <mc:Choice Requires="a14">
+          <p:sp>
+            <p:nvSpPr>
+              <p:cNvPr id="7" name="矩形: 圆角 6">
+                <a:extLst>
+                  <a:ext uri="{FF2B5EF4-FFF2-40B4-BE49-F238E27FC236}">
+                    <a16:creationId xmlns:a16="http://schemas.microsoft.com/office/drawing/2014/main" id="{0400179E-0D0A-4095-A6AD-4702211A0F83}"/>
+                  </a:ext>
+                </a:extLst>
+              </p:cNvPr>
+              <p:cNvSpPr/>
+              <p:nvPr/>
+            </p:nvSpPr>
+            <p:spPr>
+              <a:xfrm>
+                <a:off x="8250821" y="3047035"/>
+                <a:ext cx="1458411" cy="763929"/>
+              </a:xfrm>
+              <a:prstGeom prst="roundRect">
+                <a:avLst/>
+              </a:prstGeom>
+            </p:spPr>
+            <p:style>
+              <a:lnRef idx="2">
+                <a:schemeClr val="accent1">
+                  <a:shade val="50000"/>
+                </a:schemeClr>
+              </a:lnRef>
+              <a:fillRef idx="1">
+                <a:schemeClr val="accent1"/>
+              </a:fillRef>
+              <a:effectRef idx="0">
+                <a:schemeClr val="accent1"/>
+              </a:effectRef>
+              <a:fontRef idx="minor">
+                <a:schemeClr val="lt1"/>
+              </a:fontRef>
+            </p:style>
+            <p:txBody>
+              <a:bodyPr rtlCol="0" anchor="ctr"/>
+              <a:lstStyle/>
+              <a:p>
+                <a:pPr algn="ctr"/>
+                <a14:m>
+                  <m:oMath xmlns:m="http://schemas.openxmlformats.org/officeDocument/2006/math">
+                    <m:sSup>
+                      <m:sSupPr>
+                        <m:ctrlPr>
+                          <a:rPr lang="en-US" altLang="zh-CN" b="0" i="1" smtClean="0">
+                            <a:latin typeface="Cambria Math" panose="02040503050406030204" pitchFamily="18" charset="0"/>
+                          </a:rPr>
+                        </m:ctrlPr>
+                      </m:sSupPr>
+                      <m:e>
+                        <m:r>
+                          <a:rPr lang="en-US" altLang="zh-CN" b="0" i="1" smtClean="0">
+                            <a:latin typeface="Cambria Math" panose="02040503050406030204" pitchFamily="18" charset="0"/>
+                          </a:rPr>
+                          <m:t>4</m:t>
+                        </m:r>
+                      </m:e>
+                      <m:sup>
+                        <m:r>
+                          <a:rPr lang="en-US" altLang="zh-CN" b="0" i="1" smtClean="0">
+                            <a:latin typeface="Cambria Math" panose="02040503050406030204" pitchFamily="18" charset="0"/>
+                          </a:rPr>
+                          <m:t>𝑡h</m:t>
+                        </m:r>
+                      </m:sup>
+                    </m:sSup>
+                  </m:oMath>
+                </a14:m>
+                <a:r>
+                  <a:rPr lang="zh-CN" altLang="en-US" dirty="0"/>
+                  <a:t> </a:t>
+                </a:r>
+                <a:r>
+                  <a:rPr lang="en-US" altLang="zh-CN" dirty="0"/>
+                  <a:t>Block</a:t>
+                </a:r>
+                <a:endParaRPr lang="zh-CN" altLang="en-US" dirty="0"/>
+              </a:p>
+            </p:txBody>
+          </p:sp>
+        </mc:Choice>
+        <mc:Fallback xmlns="">
+          <p:sp>
+            <p:nvSpPr>
+              <p:cNvPr id="7" name="矩形: 圆角 6">
+                <a:extLst>
+                  <a:ext uri="{FF2B5EF4-FFF2-40B4-BE49-F238E27FC236}">
+                    <a16:creationId xmlns:a16="http://schemas.microsoft.com/office/drawing/2014/main" id="{0400179E-0D0A-4095-A6AD-4702211A0F83}"/>
+                  </a:ext>
+                </a:extLst>
+              </p:cNvPr>
+              <p:cNvSpPr>
+                <a:spLocks noRot="1" noChangeAspect="1" noMove="1" noResize="1" noEditPoints="1" noAdjustHandles="1" noChangeArrowheads="1" noChangeShapeType="1" noTextEdit="1"/>
+              </p:cNvSpPr>
+              <p:nvPr/>
+            </p:nvSpPr>
+            <p:spPr>
+              <a:xfrm>
+                <a:off x="8250821" y="3047035"/>
+                <a:ext cx="1458411" cy="763929"/>
+              </a:xfrm>
+              <a:prstGeom prst="roundRect">
+                <a:avLst/>
+              </a:prstGeom>
+              <a:blipFill>
+                <a:blip r:embed="rId5"/>
+                <a:stretch>
+                  <a:fillRect/>
+                </a:stretch>
+              </a:blipFill>
+            </p:spPr>
+            <p:txBody>
+              <a:bodyPr/>
+              <a:lstStyle/>
+              <a:p>
+                <a:r>
+                  <a:rPr lang="zh-CN" altLang="en-US">
+                    <a:noFill/>
+                  </a:rPr>
+                  <a:t> </a:t>
+                </a:r>
+              </a:p>
+            </p:txBody>
+          </p:sp>
+        </mc:Fallback>
+      </mc:AlternateContent>
+      <mc:AlternateContent xmlns:mc="http://schemas.openxmlformats.org/markup-compatibility/2006" xmlns:a14="http://schemas.microsoft.com/office/drawing/2010/main">
+        <mc:Choice Requires="a14">
+          <p:sp>
+            <p:nvSpPr>
+              <p:cNvPr id="8" name="矩形 7">
+                <a:extLst>
+                  <a:ext uri="{FF2B5EF4-FFF2-40B4-BE49-F238E27FC236}">
+                    <a16:creationId xmlns:a16="http://schemas.microsoft.com/office/drawing/2014/main" id="{A0C67EE0-A3CE-42E0-8716-E54542EA149C}"/>
+                  </a:ext>
+                </a:extLst>
+              </p:cNvPr>
+              <p:cNvSpPr/>
+              <p:nvPr/>
+            </p:nvSpPr>
+            <p:spPr>
+              <a:xfrm>
+                <a:off x="1786357" y="1643604"/>
+                <a:ext cx="1458411" cy="763929"/>
+              </a:xfrm>
+              <a:prstGeom prst="rect">
+                <a:avLst/>
+              </a:prstGeom>
+            </p:spPr>
+            <p:style>
+              <a:lnRef idx="2">
+                <a:schemeClr val="accent1">
+                  <a:shade val="50000"/>
+                </a:schemeClr>
+              </a:lnRef>
+              <a:fillRef idx="1">
+                <a:schemeClr val="accent1"/>
+              </a:fillRef>
+              <a:effectRef idx="0">
+                <a:schemeClr val="accent1"/>
+              </a:effectRef>
+              <a:fontRef idx="minor">
+                <a:schemeClr val="lt1"/>
+              </a:fontRef>
+            </p:style>
+            <p:txBody>
+              <a:bodyPr rtlCol="0" anchor="ctr"/>
+              <a:lstStyle/>
+              <a:p>
+                <a:pPr algn="ctr"/>
+                <a14:m>
+                  <m:oMath xmlns:m="http://schemas.openxmlformats.org/officeDocument/2006/math">
+                    <m:sSup>
+                      <m:sSupPr>
+                        <m:ctrlPr>
+                          <a:rPr lang="en-US" altLang="zh-CN" b="0" i="1" smtClean="0">
+                            <a:latin typeface="Cambria Math" panose="02040503050406030204" pitchFamily="18" charset="0"/>
+                          </a:rPr>
+                        </m:ctrlPr>
+                      </m:sSupPr>
+                      <m:e>
+                        <m:r>
+                          <a:rPr lang="en-US" altLang="zh-CN" b="0" i="1" smtClean="0">
+                            <a:latin typeface="Cambria Math" panose="02040503050406030204" pitchFamily="18" charset="0"/>
+                          </a:rPr>
+                          <m:t>1</m:t>
+                        </m:r>
+                      </m:e>
+                      <m:sup>
+                        <m:r>
+                          <a:rPr lang="en-US" altLang="zh-CN" b="0" i="1" smtClean="0">
+                            <a:latin typeface="Cambria Math" panose="02040503050406030204" pitchFamily="18" charset="0"/>
+                          </a:rPr>
+                          <m:t>𝑠𝑡</m:t>
+                        </m:r>
+                      </m:sup>
+                    </m:sSup>
+                  </m:oMath>
+                </a14:m>
+                <a:r>
+                  <a:rPr lang="zh-CN" altLang="en-US" dirty="0"/>
+                  <a:t> </a:t>
+                </a:r>
+                <a:r>
+                  <a:rPr lang="en-US" altLang="zh-CN" dirty="0"/>
+                  <a:t>segment</a:t>
+                </a:r>
+                <a:endParaRPr lang="zh-CN" altLang="en-US" dirty="0"/>
+              </a:p>
+            </p:txBody>
+          </p:sp>
+        </mc:Choice>
+        <mc:Fallback xmlns="">
+          <p:sp>
+            <p:nvSpPr>
+              <p:cNvPr id="8" name="矩形 7">
+                <a:extLst>
+                  <a:ext uri="{FF2B5EF4-FFF2-40B4-BE49-F238E27FC236}">
+                    <a16:creationId xmlns:a16="http://schemas.microsoft.com/office/drawing/2014/main" id="{A0C67EE0-A3CE-42E0-8716-E54542EA149C}"/>
+                  </a:ext>
+                </a:extLst>
+              </p:cNvPr>
+              <p:cNvSpPr>
+                <a:spLocks noRot="1" noChangeAspect="1" noMove="1" noResize="1" noEditPoints="1" noAdjustHandles="1" noChangeArrowheads="1" noChangeShapeType="1" noTextEdit="1"/>
+              </p:cNvSpPr>
+              <p:nvPr/>
+            </p:nvSpPr>
+            <p:spPr>
+              <a:xfrm>
+                <a:off x="1786357" y="1643604"/>
+                <a:ext cx="1458411" cy="763929"/>
+              </a:xfrm>
+              <a:prstGeom prst="rect">
+                <a:avLst/>
+              </a:prstGeom>
+              <a:blipFill>
+                <a:blip r:embed="rId6"/>
+                <a:stretch>
+                  <a:fillRect r="-1660"/>
+                </a:stretch>
+              </a:blipFill>
+            </p:spPr>
+            <p:txBody>
+              <a:bodyPr/>
+              <a:lstStyle/>
+              <a:p>
+                <a:r>
+                  <a:rPr lang="zh-CN" altLang="en-US">
+                    <a:noFill/>
+                  </a:rPr>
+                  <a:t> </a:t>
+                </a:r>
+              </a:p>
+            </p:txBody>
+          </p:sp>
+        </mc:Fallback>
+      </mc:AlternateContent>
+      <mc:AlternateContent xmlns:mc="http://schemas.openxmlformats.org/markup-compatibility/2006" xmlns:a14="http://schemas.microsoft.com/office/drawing/2010/main">
+        <mc:Choice Requires="a14">
+          <p:sp>
+            <p:nvSpPr>
+              <p:cNvPr id="9" name="矩形 8">
+                <a:extLst>
+                  <a:ext uri="{FF2B5EF4-FFF2-40B4-BE49-F238E27FC236}">
+                    <a16:creationId xmlns:a16="http://schemas.microsoft.com/office/drawing/2014/main" id="{4287843C-7024-4B04-8EB3-D17D5B225871}"/>
+                  </a:ext>
+                </a:extLst>
+              </p:cNvPr>
+              <p:cNvSpPr/>
+              <p:nvPr/>
+            </p:nvSpPr>
+            <p:spPr>
+              <a:xfrm>
+                <a:off x="3941179" y="1643604"/>
+                <a:ext cx="1458411" cy="763929"/>
+              </a:xfrm>
+              <a:prstGeom prst="rect">
+                <a:avLst/>
+              </a:prstGeom>
+            </p:spPr>
+            <p:style>
+              <a:lnRef idx="2">
+                <a:schemeClr val="accent1">
+                  <a:shade val="50000"/>
+                </a:schemeClr>
+              </a:lnRef>
+              <a:fillRef idx="1">
+                <a:schemeClr val="accent1"/>
+              </a:fillRef>
+              <a:effectRef idx="0">
+                <a:schemeClr val="accent1"/>
+              </a:effectRef>
+              <a:fontRef idx="minor">
+                <a:schemeClr val="lt1"/>
+              </a:fontRef>
+            </p:style>
+            <p:txBody>
+              <a:bodyPr rtlCol="0" anchor="ctr"/>
+              <a:lstStyle/>
+              <a:p>
+                <a:pPr algn="ctr"/>
+                <a14:m>
+                  <m:oMath xmlns:m="http://schemas.openxmlformats.org/officeDocument/2006/math">
+                    <m:sSup>
+                      <m:sSupPr>
+                        <m:ctrlPr>
+                          <a:rPr lang="en-US" altLang="zh-CN" i="1" smtClean="0">
+                            <a:latin typeface="Cambria Math" panose="02040503050406030204" pitchFamily="18" charset="0"/>
+                          </a:rPr>
+                        </m:ctrlPr>
+                      </m:sSupPr>
+                      <m:e>
+                        <m:r>
+                          <a:rPr lang="en-US" altLang="zh-CN" b="0" i="1" smtClean="0">
+                            <a:latin typeface="Cambria Math" panose="02040503050406030204" pitchFamily="18" charset="0"/>
+                          </a:rPr>
+                          <m:t>2</m:t>
+                        </m:r>
+                      </m:e>
+                      <m:sup>
+                        <m:r>
+                          <a:rPr lang="en-US" altLang="zh-CN" b="0" i="1" smtClean="0">
+                            <a:latin typeface="Cambria Math" panose="02040503050406030204" pitchFamily="18" charset="0"/>
+                          </a:rPr>
+                          <m:t>𝑛𝑑</m:t>
+                        </m:r>
+                      </m:sup>
+                    </m:sSup>
+                  </m:oMath>
+                </a14:m>
+                <a:r>
+                  <a:rPr lang="zh-CN" altLang="en-US" dirty="0"/>
+                  <a:t> </a:t>
+                </a:r>
+                <a:r>
+                  <a:rPr lang="en-US" altLang="zh-CN" dirty="0"/>
+                  <a:t>segment</a:t>
+                </a:r>
+                <a:endParaRPr lang="zh-CN" altLang="en-US" dirty="0"/>
+              </a:p>
+            </p:txBody>
+          </p:sp>
+        </mc:Choice>
+        <mc:Fallback xmlns="">
+          <p:sp>
+            <p:nvSpPr>
+              <p:cNvPr id="9" name="矩形 8">
+                <a:extLst>
+                  <a:ext uri="{FF2B5EF4-FFF2-40B4-BE49-F238E27FC236}">
+                    <a16:creationId xmlns:a16="http://schemas.microsoft.com/office/drawing/2014/main" id="{4287843C-7024-4B04-8EB3-D17D5B225871}"/>
+                  </a:ext>
+                </a:extLst>
+              </p:cNvPr>
+              <p:cNvSpPr>
+                <a:spLocks noRot="1" noChangeAspect="1" noMove="1" noResize="1" noEditPoints="1" noAdjustHandles="1" noChangeArrowheads="1" noChangeShapeType="1" noTextEdit="1"/>
+              </p:cNvSpPr>
+              <p:nvPr/>
+            </p:nvSpPr>
+            <p:spPr>
+              <a:xfrm>
+                <a:off x="3941179" y="1643604"/>
+                <a:ext cx="1458411" cy="763929"/>
+              </a:xfrm>
+              <a:prstGeom prst="rect">
+                <a:avLst/>
+              </a:prstGeom>
+              <a:blipFill>
+                <a:blip r:embed="rId7"/>
+                <a:stretch>
+                  <a:fillRect r="-2905"/>
+                </a:stretch>
+              </a:blipFill>
+            </p:spPr>
+            <p:txBody>
+              <a:bodyPr/>
+              <a:lstStyle/>
+              <a:p>
+                <a:r>
+                  <a:rPr lang="zh-CN" altLang="en-US">
+                    <a:noFill/>
+                  </a:rPr>
+                  <a:t> </a:t>
+                </a:r>
+              </a:p>
+            </p:txBody>
+          </p:sp>
+        </mc:Fallback>
+      </mc:AlternateContent>
+      <mc:AlternateContent xmlns:mc="http://schemas.openxmlformats.org/markup-compatibility/2006" xmlns:a14="http://schemas.microsoft.com/office/drawing/2010/main">
+        <mc:Choice Requires="a14">
+          <p:sp>
+            <p:nvSpPr>
+              <p:cNvPr id="10" name="矩形 9">
+                <a:extLst>
+                  <a:ext uri="{FF2B5EF4-FFF2-40B4-BE49-F238E27FC236}">
+                    <a16:creationId xmlns:a16="http://schemas.microsoft.com/office/drawing/2014/main" id="{339B2821-EADF-4D87-8833-2DF81A854D82}"/>
+                  </a:ext>
+                </a:extLst>
+              </p:cNvPr>
+              <p:cNvSpPr/>
+              <p:nvPr/>
+            </p:nvSpPr>
+            <p:spPr>
+              <a:xfrm>
+                <a:off x="6096000" y="1643604"/>
+                <a:ext cx="1458411" cy="763929"/>
+              </a:xfrm>
+              <a:prstGeom prst="rect">
+                <a:avLst/>
+              </a:prstGeom>
+            </p:spPr>
+            <p:style>
+              <a:lnRef idx="2">
+                <a:schemeClr val="accent1">
+                  <a:shade val="50000"/>
+                </a:schemeClr>
+              </a:lnRef>
+              <a:fillRef idx="1">
+                <a:schemeClr val="accent1"/>
+              </a:fillRef>
+              <a:effectRef idx="0">
+                <a:schemeClr val="accent1"/>
+              </a:effectRef>
+              <a:fontRef idx="minor">
+                <a:schemeClr val="lt1"/>
+              </a:fontRef>
+            </p:style>
+            <p:txBody>
+              <a:bodyPr rtlCol="0" anchor="ctr"/>
+              <a:lstStyle/>
+              <a:p>
+                <a:pPr algn="ctr"/>
+                <a14:m>
+                  <m:oMath xmlns:m="http://schemas.openxmlformats.org/officeDocument/2006/math">
+                    <m:sSup>
+                      <m:sSupPr>
+                        <m:ctrlPr>
+                          <a:rPr lang="en-US" altLang="zh-CN" i="1" smtClean="0">
+                            <a:latin typeface="Cambria Math" panose="02040503050406030204" pitchFamily="18" charset="0"/>
+                          </a:rPr>
+                        </m:ctrlPr>
+                      </m:sSupPr>
+                      <m:e>
+                        <m:r>
+                          <a:rPr lang="en-US" altLang="zh-CN" b="0" i="1" smtClean="0">
+                            <a:latin typeface="Cambria Math" panose="02040503050406030204" pitchFamily="18" charset="0"/>
+                          </a:rPr>
+                          <m:t>3</m:t>
+                        </m:r>
+                      </m:e>
+                      <m:sup>
+                        <m:r>
+                          <a:rPr lang="en-US" altLang="zh-CN" b="0" i="1" smtClean="0">
+                            <a:latin typeface="Cambria Math" panose="02040503050406030204" pitchFamily="18" charset="0"/>
+                          </a:rPr>
+                          <m:t>𝑟𝑑</m:t>
+                        </m:r>
+                      </m:sup>
+                    </m:sSup>
+                  </m:oMath>
+                </a14:m>
+                <a:r>
+                  <a:rPr lang="zh-CN" altLang="en-US" dirty="0"/>
+                  <a:t> </a:t>
+                </a:r>
+                <a:r>
+                  <a:rPr lang="en-US" altLang="zh-CN" dirty="0"/>
+                  <a:t>segment</a:t>
+                </a:r>
+                <a:endParaRPr lang="zh-CN" altLang="en-US" dirty="0"/>
+              </a:p>
+            </p:txBody>
+          </p:sp>
+        </mc:Choice>
+        <mc:Fallback xmlns="">
+          <p:sp>
+            <p:nvSpPr>
+              <p:cNvPr id="10" name="矩形 9">
+                <a:extLst>
+                  <a:ext uri="{FF2B5EF4-FFF2-40B4-BE49-F238E27FC236}">
+                    <a16:creationId xmlns:a16="http://schemas.microsoft.com/office/drawing/2014/main" id="{339B2821-EADF-4D87-8833-2DF81A854D82}"/>
+                  </a:ext>
+                </a:extLst>
+              </p:cNvPr>
+              <p:cNvSpPr>
+                <a:spLocks noRot="1" noChangeAspect="1" noMove="1" noResize="1" noEditPoints="1" noAdjustHandles="1" noChangeArrowheads="1" noChangeShapeType="1" noTextEdit="1"/>
+              </p:cNvSpPr>
+              <p:nvPr/>
+            </p:nvSpPr>
+            <p:spPr>
+              <a:xfrm>
+                <a:off x="6096000" y="1643604"/>
+                <a:ext cx="1458411" cy="763929"/>
+              </a:xfrm>
+              <a:prstGeom prst="rect">
+                <a:avLst/>
+              </a:prstGeom>
+              <a:blipFill>
+                <a:blip r:embed="rId8"/>
+                <a:stretch>
+                  <a:fillRect r="-2905"/>
+                </a:stretch>
+              </a:blipFill>
+            </p:spPr>
+            <p:txBody>
+              <a:bodyPr/>
+              <a:lstStyle/>
+              <a:p>
+                <a:r>
+                  <a:rPr lang="zh-CN" altLang="en-US">
+                    <a:noFill/>
+                  </a:rPr>
+                  <a:t> </a:t>
+                </a:r>
+              </a:p>
+            </p:txBody>
+          </p:sp>
+        </mc:Fallback>
+      </mc:AlternateContent>
+      <mc:AlternateContent xmlns:mc="http://schemas.openxmlformats.org/markup-compatibility/2006" xmlns:a14="http://schemas.microsoft.com/office/drawing/2010/main">
+        <mc:Choice Requires="a14">
+          <p:sp>
+            <p:nvSpPr>
+              <p:cNvPr id="11" name="矩形 10">
+                <a:extLst>
+                  <a:ext uri="{FF2B5EF4-FFF2-40B4-BE49-F238E27FC236}">
+                    <a16:creationId xmlns:a16="http://schemas.microsoft.com/office/drawing/2014/main" id="{CF6D0211-8B15-41BB-B738-5B03F2DB6A3D}"/>
+                  </a:ext>
+                </a:extLst>
+              </p:cNvPr>
+              <p:cNvSpPr/>
+              <p:nvPr/>
+            </p:nvSpPr>
+            <p:spPr>
+              <a:xfrm>
+                <a:off x="8250821" y="1643604"/>
+                <a:ext cx="1458411" cy="763929"/>
+              </a:xfrm>
+              <a:prstGeom prst="rect">
+                <a:avLst/>
+              </a:prstGeom>
+            </p:spPr>
+            <p:style>
+              <a:lnRef idx="2">
+                <a:schemeClr val="accent1">
+                  <a:shade val="50000"/>
+                </a:schemeClr>
+              </a:lnRef>
+              <a:fillRef idx="1">
+                <a:schemeClr val="accent1"/>
+              </a:fillRef>
+              <a:effectRef idx="0">
+                <a:schemeClr val="accent1"/>
+              </a:effectRef>
+              <a:fontRef idx="minor">
+                <a:schemeClr val="lt1"/>
+              </a:fontRef>
+            </p:style>
+            <p:txBody>
+              <a:bodyPr rtlCol="0" anchor="ctr"/>
+              <a:lstStyle/>
+              <a:p>
+                <a:pPr algn="ctr"/>
+                <a14:m>
+                  <m:oMath xmlns:m="http://schemas.openxmlformats.org/officeDocument/2006/math">
+                    <m:sSup>
+                      <m:sSupPr>
+                        <m:ctrlPr>
+                          <a:rPr lang="en-US" altLang="zh-CN" i="1" smtClean="0">
+                            <a:latin typeface="Cambria Math" panose="02040503050406030204" pitchFamily="18" charset="0"/>
+                          </a:rPr>
+                        </m:ctrlPr>
+                      </m:sSupPr>
+                      <m:e>
+                        <m:r>
+                          <a:rPr lang="en-US" altLang="zh-CN" b="0" i="1" smtClean="0">
+                            <a:latin typeface="Cambria Math" panose="02040503050406030204" pitchFamily="18" charset="0"/>
+                          </a:rPr>
+                          <m:t>4</m:t>
+                        </m:r>
+                      </m:e>
+                      <m:sup>
+                        <m:r>
+                          <a:rPr lang="en-US" altLang="zh-CN" b="0" i="1" smtClean="0">
+                            <a:latin typeface="Cambria Math" panose="02040503050406030204" pitchFamily="18" charset="0"/>
+                          </a:rPr>
+                          <m:t>𝑡h</m:t>
+                        </m:r>
+                      </m:sup>
+                    </m:sSup>
+                  </m:oMath>
+                </a14:m>
+                <a:r>
+                  <a:rPr lang="zh-CN" altLang="en-US" dirty="0"/>
+                  <a:t> </a:t>
+                </a:r>
+                <a:r>
+                  <a:rPr lang="en-US" altLang="zh-CN" dirty="0"/>
+                  <a:t>segment</a:t>
+                </a:r>
+                <a:endParaRPr lang="zh-CN" altLang="en-US" dirty="0"/>
+              </a:p>
+            </p:txBody>
+          </p:sp>
+        </mc:Choice>
+        <mc:Fallback xmlns="">
+          <p:sp>
+            <p:nvSpPr>
+              <p:cNvPr id="11" name="矩形 10">
+                <a:extLst>
+                  <a:ext uri="{FF2B5EF4-FFF2-40B4-BE49-F238E27FC236}">
+                    <a16:creationId xmlns:a16="http://schemas.microsoft.com/office/drawing/2014/main" id="{CF6D0211-8B15-41BB-B738-5B03F2DB6A3D}"/>
+                  </a:ext>
+                </a:extLst>
+              </p:cNvPr>
+              <p:cNvSpPr>
+                <a:spLocks noRot="1" noChangeAspect="1" noMove="1" noResize="1" noEditPoints="1" noAdjustHandles="1" noChangeArrowheads="1" noChangeShapeType="1" noTextEdit="1"/>
+              </p:cNvSpPr>
+              <p:nvPr/>
+            </p:nvSpPr>
+            <p:spPr>
+              <a:xfrm>
+                <a:off x="8250821" y="1643604"/>
+                <a:ext cx="1458411" cy="763929"/>
+              </a:xfrm>
+              <a:prstGeom prst="rect">
+                <a:avLst/>
+              </a:prstGeom>
+              <a:blipFill>
+                <a:blip r:embed="rId9"/>
+                <a:stretch>
+                  <a:fillRect r="-1653"/>
+                </a:stretch>
+              </a:blipFill>
+            </p:spPr>
+            <p:txBody>
+              <a:bodyPr/>
+              <a:lstStyle/>
+              <a:p>
+                <a:r>
+                  <a:rPr lang="zh-CN" altLang="en-US">
+                    <a:noFill/>
+                  </a:rPr>
+                  <a:t> </a:t>
+                </a:r>
+              </a:p>
+            </p:txBody>
+          </p:sp>
+        </mc:Fallback>
+      </mc:AlternateContent>
+      <mc:AlternateContent xmlns:mc="http://schemas.openxmlformats.org/markup-compatibility/2006" xmlns:a14="http://schemas.microsoft.com/office/drawing/2010/main">
+        <mc:Choice Requires="a14">
+          <p:sp>
+            <p:nvSpPr>
+              <p:cNvPr id="15" name="箭头: 右 14">
+                <a:extLst>
+                  <a:ext uri="{FF2B5EF4-FFF2-40B4-BE49-F238E27FC236}">
+                    <a16:creationId xmlns:a16="http://schemas.microsoft.com/office/drawing/2014/main" id="{5C6655AA-E1D0-4992-B85D-49935097C5C9}"/>
+                  </a:ext>
+                </a:extLst>
+              </p:cNvPr>
+              <p:cNvSpPr/>
+              <p:nvPr/>
+            </p:nvSpPr>
+            <p:spPr>
+              <a:xfrm>
+                <a:off x="1089948" y="3206910"/>
+                <a:ext cx="696409" cy="444178"/>
+              </a:xfrm>
+              <a:prstGeom prst="rightArrow">
+                <a:avLst/>
+              </a:prstGeom>
+            </p:spPr>
+            <p:style>
+              <a:lnRef idx="2">
+                <a:schemeClr val="accent1">
+                  <a:shade val="50000"/>
+                </a:schemeClr>
+              </a:lnRef>
+              <a:fillRef idx="1">
+                <a:schemeClr val="accent1"/>
+              </a:fillRef>
+              <a:effectRef idx="0">
+                <a:schemeClr val="accent1"/>
+              </a:effectRef>
+              <a:fontRef idx="minor">
+                <a:schemeClr val="lt1"/>
+              </a:fontRef>
+            </p:style>
+            <p:txBody>
+              <a:bodyPr rtlCol="0" anchor="ctr"/>
+              <a:lstStyle/>
+              <a:p>
+                <a:pPr algn="ctr"/>
+                <a14:m>
+                  <m:oMathPara xmlns:m="http://schemas.openxmlformats.org/officeDocument/2006/math">
+                    <m:oMathParaPr>
+                      <m:jc m:val="centerGroup"/>
+                    </m:oMathParaPr>
+                    <m:oMath xmlns:m="http://schemas.openxmlformats.org/officeDocument/2006/math">
+                      <m:r>
+                        <a:rPr lang="en-US" altLang="zh-CN" b="0" i="1" smtClean="0">
+                          <a:latin typeface="Cambria Math" panose="02040503050406030204" pitchFamily="18" charset="0"/>
+                        </a:rPr>
+                        <m:t>𝐼</m:t>
+                      </m:r>
+                      <m:sSub>
+                        <m:sSubPr>
+                          <m:ctrlPr>
+                            <a:rPr lang="en-US" altLang="zh-CN" b="0" i="1" smtClean="0">
+                              <a:latin typeface="Cambria Math" panose="02040503050406030204" pitchFamily="18" charset="0"/>
+                            </a:rPr>
+                          </m:ctrlPr>
+                        </m:sSubPr>
+                        <m:e>
+                          <m:r>
+                            <a:rPr lang="en-US" altLang="zh-CN" b="0" i="1" smtClean="0">
+                              <a:latin typeface="Cambria Math" panose="02040503050406030204" pitchFamily="18" charset="0"/>
+                            </a:rPr>
+                            <m:t>𝐻𝑉</m:t>
+                          </m:r>
+                        </m:e>
+                        <m:sub>
+                          <m:r>
+                            <a:rPr lang="en-US" altLang="zh-CN" b="0" i="1" smtClean="0">
+                              <a:latin typeface="Cambria Math" panose="02040503050406030204" pitchFamily="18" charset="0"/>
+                            </a:rPr>
+                            <m:t>0</m:t>
+                          </m:r>
+                        </m:sub>
+                      </m:sSub>
+                    </m:oMath>
+                  </m:oMathPara>
+                </a14:m>
+                <a:endParaRPr lang="zh-CN" altLang="en-US" dirty="0"/>
+              </a:p>
+            </p:txBody>
+          </p:sp>
+        </mc:Choice>
+        <mc:Fallback xmlns="">
+          <p:sp>
+            <p:nvSpPr>
+              <p:cNvPr id="15" name="箭头: 右 14">
+                <a:extLst>
+                  <a:ext uri="{FF2B5EF4-FFF2-40B4-BE49-F238E27FC236}">
+                    <a16:creationId xmlns:a16="http://schemas.microsoft.com/office/drawing/2014/main" id="{5C6655AA-E1D0-4992-B85D-49935097C5C9}"/>
+                  </a:ext>
+                </a:extLst>
+              </p:cNvPr>
+              <p:cNvSpPr>
+                <a:spLocks noRot="1" noChangeAspect="1" noMove="1" noResize="1" noEditPoints="1" noAdjustHandles="1" noChangeArrowheads="1" noChangeShapeType="1" noTextEdit="1"/>
+              </p:cNvSpPr>
+              <p:nvPr/>
+            </p:nvSpPr>
+            <p:spPr>
+              <a:xfrm>
+                <a:off x="1089948" y="3206910"/>
+                <a:ext cx="696409" cy="444178"/>
+              </a:xfrm>
+              <a:prstGeom prst="rightArrow">
+                <a:avLst/>
+              </a:prstGeom>
+              <a:blipFill>
+                <a:blip r:embed="rId10"/>
+                <a:stretch>
+                  <a:fillRect l="-7692"/>
+                </a:stretch>
+              </a:blipFill>
+            </p:spPr>
+            <p:txBody>
+              <a:bodyPr/>
+              <a:lstStyle/>
+              <a:p>
+                <a:r>
+                  <a:rPr lang="zh-CN" altLang="en-US">
+                    <a:noFill/>
+                  </a:rPr>
+                  <a:t> </a:t>
+                </a:r>
+              </a:p>
+            </p:txBody>
+          </p:sp>
+        </mc:Fallback>
+      </mc:AlternateContent>
+      <p:cxnSp>
+        <p:nvCxnSpPr>
+          <p:cNvPr id="18" name="直接箭头连接符 17">
+            <a:extLst>
+              <a:ext uri="{FF2B5EF4-FFF2-40B4-BE49-F238E27FC236}">
+                <a16:creationId xmlns:a16="http://schemas.microsoft.com/office/drawing/2014/main" id="{EBCD4AE1-91E8-41DE-A3C9-1183DE5F1FED}"/>
+              </a:ext>
+            </a:extLst>
+          </p:cNvPr>
+          <p:cNvCxnSpPr>
+            <a:stCxn id="8" idx="2"/>
+            <a:endCxn id="4" idx="0"/>
+          </p:cNvCxnSpPr>
+          <p:nvPr/>
+        </p:nvCxnSpPr>
+        <p:spPr>
+          <a:xfrm>
+            <a:off x="2515563" y="2407533"/>
+            <a:ext cx="1" cy="639505"/>
+          </a:xfrm>
+          <a:prstGeom prst="straightConnector1">
+            <a:avLst/>
+          </a:prstGeom>
+          <a:ln w="38100">
+            <a:tailEnd type="triangle"/>
+          </a:ln>
+        </p:spPr>
+        <p:style>
+          <a:lnRef idx="1">
+            <a:schemeClr val="accent1"/>
+          </a:lnRef>
+          <a:fillRef idx="0">
+            <a:schemeClr val="accent1"/>
+          </a:fillRef>
+          <a:effectRef idx="0">
+            <a:schemeClr val="accent1"/>
+          </a:effectRef>
+          <a:fontRef idx="minor">
+            <a:schemeClr val="tx1"/>
+          </a:fontRef>
+        </p:style>
+      </p:cxnSp>
+      <p:cxnSp>
+        <p:nvCxnSpPr>
+          <p:cNvPr id="20" name="直接箭头连接符 19">
+            <a:extLst>
+              <a:ext uri="{FF2B5EF4-FFF2-40B4-BE49-F238E27FC236}">
+                <a16:creationId xmlns:a16="http://schemas.microsoft.com/office/drawing/2014/main" id="{2D46F675-9AFE-4354-AF26-9B4BF403C173}"/>
+              </a:ext>
+            </a:extLst>
+          </p:cNvPr>
+          <p:cNvCxnSpPr>
+            <a:stCxn id="9" idx="2"/>
+            <a:endCxn id="5" idx="0"/>
+          </p:cNvCxnSpPr>
+          <p:nvPr/>
+        </p:nvCxnSpPr>
+        <p:spPr>
+          <a:xfrm>
+            <a:off x="4670385" y="2407533"/>
+            <a:ext cx="0" cy="639505"/>
+          </a:xfrm>
+          <a:prstGeom prst="straightConnector1">
+            <a:avLst/>
+          </a:prstGeom>
+          <a:ln w="38100">
+            <a:tailEnd type="triangle"/>
+          </a:ln>
+        </p:spPr>
+        <p:style>
+          <a:lnRef idx="1">
+            <a:schemeClr val="accent1"/>
+          </a:lnRef>
+          <a:fillRef idx="0">
+            <a:schemeClr val="accent1"/>
+          </a:fillRef>
+          <a:effectRef idx="0">
+            <a:schemeClr val="accent1"/>
+          </a:effectRef>
+          <a:fontRef idx="minor">
+            <a:schemeClr val="tx1"/>
+          </a:fontRef>
+        </p:style>
+      </p:cxnSp>
+      <p:cxnSp>
+        <p:nvCxnSpPr>
+          <p:cNvPr id="22" name="直接箭头连接符 21">
+            <a:extLst>
+              <a:ext uri="{FF2B5EF4-FFF2-40B4-BE49-F238E27FC236}">
+                <a16:creationId xmlns:a16="http://schemas.microsoft.com/office/drawing/2014/main" id="{473C1185-88C5-4B89-9F0C-BD1639B72BE2}"/>
+              </a:ext>
+            </a:extLst>
+          </p:cNvPr>
+          <p:cNvCxnSpPr>
+            <a:stCxn id="10" idx="2"/>
+            <a:endCxn id="6" idx="0"/>
+          </p:cNvCxnSpPr>
+          <p:nvPr/>
+        </p:nvCxnSpPr>
+        <p:spPr>
+          <a:xfrm>
+            <a:off x="6825206" y="2407533"/>
+            <a:ext cx="0" cy="639502"/>
+          </a:xfrm>
+          <a:prstGeom prst="straightConnector1">
+            <a:avLst/>
+          </a:prstGeom>
+          <a:ln w="38100">
+            <a:tailEnd type="triangle"/>
+          </a:ln>
+        </p:spPr>
+        <p:style>
+          <a:lnRef idx="1">
+            <a:schemeClr val="accent1"/>
+          </a:lnRef>
+          <a:fillRef idx="0">
+            <a:schemeClr val="accent1"/>
+          </a:fillRef>
+          <a:effectRef idx="0">
+            <a:schemeClr val="accent1"/>
+          </a:effectRef>
+          <a:fontRef idx="minor">
+            <a:schemeClr val="tx1"/>
+          </a:fontRef>
+        </p:style>
+      </p:cxnSp>
+      <p:cxnSp>
+        <p:nvCxnSpPr>
+          <p:cNvPr id="24" name="直接箭头连接符 23">
+            <a:extLst>
+              <a:ext uri="{FF2B5EF4-FFF2-40B4-BE49-F238E27FC236}">
+                <a16:creationId xmlns:a16="http://schemas.microsoft.com/office/drawing/2014/main" id="{CBC846A9-76A4-43EA-8C19-34430A1205B4}"/>
+              </a:ext>
+            </a:extLst>
+          </p:cNvPr>
+          <p:cNvCxnSpPr>
+            <a:cxnSpLocks/>
+            <a:stCxn id="11" idx="2"/>
+            <a:endCxn id="7" idx="0"/>
+          </p:cNvCxnSpPr>
+          <p:nvPr/>
+        </p:nvCxnSpPr>
+        <p:spPr>
+          <a:xfrm>
+            <a:off x="8980027" y="2407533"/>
+            <a:ext cx="0" cy="639502"/>
+          </a:xfrm>
+          <a:prstGeom prst="straightConnector1">
+            <a:avLst/>
+          </a:prstGeom>
+          <a:ln w="38100">
+            <a:tailEnd type="triangle"/>
+          </a:ln>
+        </p:spPr>
+        <p:style>
+          <a:lnRef idx="1">
+            <a:schemeClr val="accent1"/>
+          </a:lnRef>
+          <a:fillRef idx="0">
+            <a:schemeClr val="accent1"/>
+          </a:fillRef>
+          <a:effectRef idx="0">
+            <a:schemeClr val="accent1"/>
+          </a:effectRef>
+          <a:fontRef idx="minor">
+            <a:schemeClr val="tx1"/>
+          </a:fontRef>
+        </p:style>
+      </p:cxnSp>
+      <mc:AlternateContent xmlns:mc="http://schemas.openxmlformats.org/markup-compatibility/2006" xmlns:a14="http://schemas.microsoft.com/office/drawing/2010/main">
+        <mc:Choice Requires="a14">
+          <p:sp>
+            <p:nvSpPr>
+              <p:cNvPr id="26" name="箭头: 右 25">
+                <a:extLst>
+                  <a:ext uri="{FF2B5EF4-FFF2-40B4-BE49-F238E27FC236}">
+                    <a16:creationId xmlns:a16="http://schemas.microsoft.com/office/drawing/2014/main" id="{FB72CE77-31FC-44E4-86D6-747919B2A80D}"/>
+                  </a:ext>
+                </a:extLst>
+              </p:cNvPr>
+              <p:cNvSpPr/>
+              <p:nvPr/>
+            </p:nvSpPr>
+            <p:spPr>
+              <a:xfrm>
+                <a:off x="3243805" y="3206910"/>
+                <a:ext cx="696409" cy="444178"/>
+              </a:xfrm>
+              <a:prstGeom prst="rightArrow">
+                <a:avLst/>
+              </a:prstGeom>
+            </p:spPr>
+            <p:style>
+              <a:lnRef idx="2">
+                <a:schemeClr val="accent1">
+                  <a:shade val="50000"/>
+                </a:schemeClr>
+              </a:lnRef>
+              <a:fillRef idx="1">
+                <a:schemeClr val="accent1"/>
+              </a:fillRef>
+              <a:effectRef idx="0">
+                <a:schemeClr val="accent1"/>
+              </a:effectRef>
+              <a:fontRef idx="minor">
+                <a:schemeClr val="lt1"/>
+              </a:fontRef>
+            </p:style>
+            <p:txBody>
+              <a:bodyPr rtlCol="0" anchor="ctr"/>
+              <a:lstStyle/>
+              <a:p>
+                <a:pPr algn="ctr"/>
+                <a14:m>
+                  <m:oMathPara xmlns:m="http://schemas.openxmlformats.org/officeDocument/2006/math">
+                    <m:oMathParaPr>
+                      <m:jc m:val="centerGroup"/>
+                    </m:oMathParaPr>
+                    <m:oMath xmlns:m="http://schemas.openxmlformats.org/officeDocument/2006/math">
+                      <m:r>
+                        <a:rPr lang="en-US" altLang="zh-CN" b="0" i="1" smtClean="0">
+                          <a:latin typeface="Cambria Math" panose="02040503050406030204" pitchFamily="18" charset="0"/>
+                        </a:rPr>
+                        <m:t>𝐼𝐻</m:t>
+                      </m:r>
+                      <m:sSub>
+                        <m:sSubPr>
+                          <m:ctrlPr>
+                            <a:rPr lang="en-US" altLang="zh-CN" b="0" i="1" smtClean="0">
+                              <a:latin typeface="Cambria Math" panose="02040503050406030204" pitchFamily="18" charset="0"/>
+                            </a:rPr>
+                          </m:ctrlPr>
+                        </m:sSubPr>
+                        <m:e>
+                          <m:r>
+                            <a:rPr lang="en-US" altLang="zh-CN" b="0" i="1" smtClean="0">
+                              <a:latin typeface="Cambria Math" panose="02040503050406030204" pitchFamily="18" charset="0"/>
+                            </a:rPr>
+                            <m:t>𝑉</m:t>
+                          </m:r>
+                        </m:e>
+                        <m:sub>
+                          <m:r>
+                            <a:rPr lang="en-US" altLang="zh-CN" b="0" i="1" smtClean="0">
+                              <a:latin typeface="Cambria Math" panose="02040503050406030204" pitchFamily="18" charset="0"/>
+                            </a:rPr>
+                            <m:t>1</m:t>
+                          </m:r>
+                        </m:sub>
+                      </m:sSub>
+                    </m:oMath>
+                  </m:oMathPara>
+                </a14:m>
+                <a:endParaRPr lang="zh-CN" altLang="en-US" dirty="0"/>
+              </a:p>
+            </p:txBody>
+          </p:sp>
+        </mc:Choice>
+        <mc:Fallback xmlns="">
+          <p:sp>
+            <p:nvSpPr>
+              <p:cNvPr id="26" name="箭头: 右 25">
+                <a:extLst>
+                  <a:ext uri="{FF2B5EF4-FFF2-40B4-BE49-F238E27FC236}">
+                    <a16:creationId xmlns:a16="http://schemas.microsoft.com/office/drawing/2014/main" id="{FB72CE77-31FC-44E4-86D6-747919B2A80D}"/>
+                  </a:ext>
+                </a:extLst>
+              </p:cNvPr>
+              <p:cNvSpPr>
+                <a:spLocks noRot="1" noChangeAspect="1" noMove="1" noResize="1" noEditPoints="1" noAdjustHandles="1" noChangeArrowheads="1" noChangeShapeType="1" noTextEdit="1"/>
+              </p:cNvSpPr>
+              <p:nvPr/>
+            </p:nvSpPr>
+            <p:spPr>
+              <a:xfrm>
+                <a:off x="3243805" y="3206910"/>
+                <a:ext cx="696409" cy="444178"/>
+              </a:xfrm>
+              <a:prstGeom prst="rightArrow">
+                <a:avLst/>
+              </a:prstGeom>
+              <a:blipFill>
+                <a:blip r:embed="rId11"/>
+                <a:stretch>
+                  <a:fillRect l="-6838"/>
+                </a:stretch>
+              </a:blipFill>
+            </p:spPr>
+            <p:txBody>
+              <a:bodyPr/>
+              <a:lstStyle/>
+              <a:p>
+                <a:r>
+                  <a:rPr lang="zh-CN" altLang="en-US">
+                    <a:noFill/>
+                  </a:rPr>
+                  <a:t> </a:t>
+                </a:r>
+              </a:p>
+            </p:txBody>
+          </p:sp>
+        </mc:Fallback>
+      </mc:AlternateContent>
+      <mc:AlternateContent xmlns:mc="http://schemas.openxmlformats.org/markup-compatibility/2006" xmlns:a14="http://schemas.microsoft.com/office/drawing/2010/main">
+        <mc:Choice Requires="a14">
+          <p:sp>
+            <p:nvSpPr>
+              <p:cNvPr id="27" name="箭头: 右 26">
+                <a:extLst>
+                  <a:ext uri="{FF2B5EF4-FFF2-40B4-BE49-F238E27FC236}">
+                    <a16:creationId xmlns:a16="http://schemas.microsoft.com/office/drawing/2014/main" id="{42C7D026-6FD8-4361-9DC8-1A25AF30F962}"/>
+                  </a:ext>
+                </a:extLst>
+              </p:cNvPr>
+              <p:cNvSpPr/>
+              <p:nvPr/>
+            </p:nvSpPr>
+            <p:spPr>
+              <a:xfrm>
+                <a:off x="5401520" y="3206910"/>
+                <a:ext cx="696409" cy="444178"/>
+              </a:xfrm>
+              <a:prstGeom prst="rightArrow">
+                <a:avLst/>
+              </a:prstGeom>
+            </p:spPr>
+            <p:style>
+              <a:lnRef idx="2">
+                <a:schemeClr val="accent1">
+                  <a:shade val="50000"/>
+                </a:schemeClr>
+              </a:lnRef>
+              <a:fillRef idx="1">
+                <a:schemeClr val="accent1"/>
+              </a:fillRef>
+              <a:effectRef idx="0">
+                <a:schemeClr val="accent1"/>
+              </a:effectRef>
+              <a:fontRef idx="minor">
+                <a:schemeClr val="lt1"/>
+              </a:fontRef>
+            </p:style>
+            <p:txBody>
+              <a:bodyPr rtlCol="0" anchor="ctr"/>
+              <a:lstStyle/>
+              <a:p>
+                <a:pPr algn="ctr"/>
+                <a14:m>
+                  <m:oMathPara xmlns:m="http://schemas.openxmlformats.org/officeDocument/2006/math">
+                    <m:oMathParaPr>
+                      <m:jc m:val="centerGroup"/>
+                    </m:oMathParaPr>
+                    <m:oMath xmlns:m="http://schemas.openxmlformats.org/officeDocument/2006/math">
+                      <m:r>
+                        <a:rPr lang="en-US" altLang="zh-CN" b="0" i="1" smtClean="0">
+                          <a:latin typeface="Cambria Math" panose="02040503050406030204" pitchFamily="18" charset="0"/>
+                        </a:rPr>
+                        <m:t>𝐼𝐻</m:t>
+                      </m:r>
+                      <m:sSub>
+                        <m:sSubPr>
+                          <m:ctrlPr>
+                            <a:rPr lang="en-US" altLang="zh-CN" b="0" i="1" smtClean="0">
+                              <a:latin typeface="Cambria Math" panose="02040503050406030204" pitchFamily="18" charset="0"/>
+                            </a:rPr>
+                          </m:ctrlPr>
+                        </m:sSubPr>
+                        <m:e>
+                          <m:r>
+                            <a:rPr lang="en-US" altLang="zh-CN" b="0" i="1" smtClean="0">
+                              <a:latin typeface="Cambria Math" panose="02040503050406030204" pitchFamily="18" charset="0"/>
+                            </a:rPr>
+                            <m:t>𝑉</m:t>
+                          </m:r>
+                        </m:e>
+                        <m:sub>
+                          <m:r>
+                            <a:rPr lang="en-US" altLang="zh-CN" b="0" i="1" smtClean="0">
+                              <a:latin typeface="Cambria Math" panose="02040503050406030204" pitchFamily="18" charset="0"/>
+                            </a:rPr>
+                            <m:t>2</m:t>
+                          </m:r>
+                        </m:sub>
+                      </m:sSub>
+                    </m:oMath>
+                  </m:oMathPara>
+                </a14:m>
+                <a:endParaRPr lang="zh-CN" altLang="en-US" dirty="0"/>
+              </a:p>
+            </p:txBody>
+          </p:sp>
+        </mc:Choice>
+        <mc:Fallback xmlns="">
+          <p:sp>
+            <p:nvSpPr>
+              <p:cNvPr id="27" name="箭头: 右 26">
+                <a:extLst>
+                  <a:ext uri="{FF2B5EF4-FFF2-40B4-BE49-F238E27FC236}">
+                    <a16:creationId xmlns:a16="http://schemas.microsoft.com/office/drawing/2014/main" id="{42C7D026-6FD8-4361-9DC8-1A25AF30F962}"/>
+                  </a:ext>
+                </a:extLst>
+              </p:cNvPr>
+              <p:cNvSpPr>
+                <a:spLocks noRot="1" noChangeAspect="1" noMove="1" noResize="1" noEditPoints="1" noAdjustHandles="1" noChangeArrowheads="1" noChangeShapeType="1" noTextEdit="1"/>
+              </p:cNvSpPr>
+              <p:nvPr/>
+            </p:nvSpPr>
+            <p:spPr>
+              <a:xfrm>
+                <a:off x="5401520" y="3206910"/>
+                <a:ext cx="696409" cy="444178"/>
+              </a:xfrm>
+              <a:prstGeom prst="rightArrow">
+                <a:avLst/>
+              </a:prstGeom>
+              <a:blipFill>
+                <a:blip r:embed="rId12"/>
+                <a:stretch>
+                  <a:fillRect l="-7692"/>
+                </a:stretch>
+              </a:blipFill>
+            </p:spPr>
+            <p:txBody>
+              <a:bodyPr/>
+              <a:lstStyle/>
+              <a:p>
+                <a:r>
+                  <a:rPr lang="zh-CN" altLang="en-US">
+                    <a:noFill/>
+                  </a:rPr>
+                  <a:t> </a:t>
+                </a:r>
+              </a:p>
+            </p:txBody>
+          </p:sp>
+        </mc:Fallback>
+      </mc:AlternateContent>
+      <mc:AlternateContent xmlns:mc="http://schemas.openxmlformats.org/markup-compatibility/2006" xmlns:a14="http://schemas.microsoft.com/office/drawing/2010/main">
+        <mc:Choice Requires="a14">
+          <p:sp>
+            <p:nvSpPr>
+              <p:cNvPr id="28" name="箭头: 右 27">
+                <a:extLst>
+                  <a:ext uri="{FF2B5EF4-FFF2-40B4-BE49-F238E27FC236}">
+                    <a16:creationId xmlns:a16="http://schemas.microsoft.com/office/drawing/2014/main" id="{300D3D62-16DB-4AEF-8AF2-9096AFC75972}"/>
+                  </a:ext>
+                </a:extLst>
+              </p:cNvPr>
+              <p:cNvSpPr/>
+              <p:nvPr/>
+            </p:nvSpPr>
+            <p:spPr>
+              <a:xfrm>
+                <a:off x="7554411" y="3206910"/>
+                <a:ext cx="696409" cy="444178"/>
+              </a:xfrm>
+              <a:prstGeom prst="rightArrow">
+                <a:avLst/>
+              </a:prstGeom>
+            </p:spPr>
+            <p:style>
+              <a:lnRef idx="2">
+                <a:schemeClr val="accent1">
+                  <a:shade val="50000"/>
+                </a:schemeClr>
+              </a:lnRef>
+              <a:fillRef idx="1">
+                <a:schemeClr val="accent1"/>
+              </a:fillRef>
+              <a:effectRef idx="0">
+                <a:schemeClr val="accent1"/>
+              </a:effectRef>
+              <a:fontRef idx="minor">
+                <a:schemeClr val="lt1"/>
+              </a:fontRef>
+            </p:style>
+            <p:txBody>
+              <a:bodyPr rtlCol="0" anchor="ctr"/>
+              <a:lstStyle/>
+              <a:p>
+                <a:pPr algn="ctr"/>
+                <a14:m>
+                  <m:oMathPara xmlns:m="http://schemas.openxmlformats.org/officeDocument/2006/math">
+                    <m:oMathParaPr>
+                      <m:jc m:val="centerGroup"/>
+                    </m:oMathParaPr>
+                    <m:oMath xmlns:m="http://schemas.openxmlformats.org/officeDocument/2006/math">
+                      <m:r>
+                        <a:rPr lang="en-US" altLang="zh-CN" b="0" i="1" smtClean="0">
+                          <a:latin typeface="Cambria Math" panose="02040503050406030204" pitchFamily="18" charset="0"/>
+                        </a:rPr>
+                        <m:t>𝐼𝐻</m:t>
+                      </m:r>
+                      <m:sSub>
+                        <m:sSubPr>
+                          <m:ctrlPr>
+                            <a:rPr lang="en-US" altLang="zh-CN" b="0" i="1" smtClean="0">
+                              <a:latin typeface="Cambria Math" panose="02040503050406030204" pitchFamily="18" charset="0"/>
+                            </a:rPr>
+                          </m:ctrlPr>
+                        </m:sSubPr>
+                        <m:e>
+                          <m:r>
+                            <a:rPr lang="en-US" altLang="zh-CN" b="0" i="1" smtClean="0">
+                              <a:latin typeface="Cambria Math" panose="02040503050406030204" pitchFamily="18" charset="0"/>
+                            </a:rPr>
+                            <m:t>𝑉</m:t>
+                          </m:r>
+                        </m:e>
+                        <m:sub>
+                          <m:r>
+                            <a:rPr lang="en-US" altLang="zh-CN" b="0" i="1" smtClean="0">
+                              <a:latin typeface="Cambria Math" panose="02040503050406030204" pitchFamily="18" charset="0"/>
+                            </a:rPr>
+                            <m:t>3</m:t>
+                          </m:r>
+                        </m:sub>
+                      </m:sSub>
+                    </m:oMath>
+                  </m:oMathPara>
+                </a14:m>
+                <a:endParaRPr lang="zh-CN" altLang="en-US" dirty="0"/>
+              </a:p>
+            </p:txBody>
+          </p:sp>
+        </mc:Choice>
+        <mc:Fallback xmlns="">
+          <p:sp>
+            <p:nvSpPr>
+              <p:cNvPr id="28" name="箭头: 右 27">
+                <a:extLst>
+                  <a:ext uri="{FF2B5EF4-FFF2-40B4-BE49-F238E27FC236}">
+                    <a16:creationId xmlns:a16="http://schemas.microsoft.com/office/drawing/2014/main" id="{300D3D62-16DB-4AEF-8AF2-9096AFC75972}"/>
+                  </a:ext>
+                </a:extLst>
+              </p:cNvPr>
+              <p:cNvSpPr>
+                <a:spLocks noRot="1" noChangeAspect="1" noMove="1" noResize="1" noEditPoints="1" noAdjustHandles="1" noChangeArrowheads="1" noChangeShapeType="1" noTextEdit="1"/>
+              </p:cNvSpPr>
+              <p:nvPr/>
+            </p:nvSpPr>
+            <p:spPr>
+              <a:xfrm>
+                <a:off x="7554411" y="3206910"/>
+                <a:ext cx="696409" cy="444178"/>
+              </a:xfrm>
+              <a:prstGeom prst="rightArrow">
+                <a:avLst/>
+              </a:prstGeom>
+              <a:blipFill>
+                <a:blip r:embed="rId13"/>
+                <a:stretch>
+                  <a:fillRect l="-7692"/>
+                </a:stretch>
+              </a:blipFill>
+            </p:spPr>
+            <p:txBody>
+              <a:bodyPr/>
+              <a:lstStyle/>
+              <a:p>
+                <a:r>
+                  <a:rPr lang="zh-CN" altLang="en-US">
+                    <a:noFill/>
+                  </a:rPr>
+                  <a:t> </a:t>
+                </a:r>
+              </a:p>
+            </p:txBody>
+          </p:sp>
+        </mc:Fallback>
+      </mc:AlternateContent>
+      <mc:AlternateContent xmlns:mc="http://schemas.openxmlformats.org/markup-compatibility/2006" xmlns:a14="http://schemas.microsoft.com/office/drawing/2010/main">
+        <mc:Choice Requires="a14">
+          <p:sp>
+            <p:nvSpPr>
+              <p:cNvPr id="29" name="箭头: 右 28">
+                <a:extLst>
+                  <a:ext uri="{FF2B5EF4-FFF2-40B4-BE49-F238E27FC236}">
+                    <a16:creationId xmlns:a16="http://schemas.microsoft.com/office/drawing/2014/main" id="{B568228E-66A1-4D22-8B90-8B9885663673}"/>
+                  </a:ext>
+                </a:extLst>
+              </p:cNvPr>
+              <p:cNvSpPr/>
+              <p:nvPr/>
+            </p:nvSpPr>
+            <p:spPr>
+              <a:xfrm>
+                <a:off x="9709233" y="3206910"/>
+                <a:ext cx="696409" cy="444178"/>
+              </a:xfrm>
+              <a:prstGeom prst="rightArrow">
+                <a:avLst/>
+              </a:prstGeom>
+            </p:spPr>
+            <p:style>
+              <a:lnRef idx="2">
+                <a:schemeClr val="accent1">
+                  <a:shade val="50000"/>
+                </a:schemeClr>
+              </a:lnRef>
+              <a:fillRef idx="1">
+                <a:schemeClr val="accent1"/>
+              </a:fillRef>
+              <a:effectRef idx="0">
+                <a:schemeClr val="accent1"/>
+              </a:effectRef>
+              <a:fontRef idx="minor">
+                <a:schemeClr val="lt1"/>
+              </a:fontRef>
+            </p:style>
+            <p:txBody>
+              <a:bodyPr rtlCol="0" anchor="ctr"/>
+              <a:lstStyle/>
+              <a:p>
+                <a:pPr algn="ctr"/>
+                <a14:m>
+                  <m:oMathPara xmlns:m="http://schemas.openxmlformats.org/officeDocument/2006/math">
+                    <m:oMathParaPr>
+                      <m:jc m:val="centerGroup"/>
+                    </m:oMathParaPr>
+                    <m:oMath xmlns:m="http://schemas.openxmlformats.org/officeDocument/2006/math">
+                      <m:r>
+                        <a:rPr lang="en-US" altLang="zh-CN" b="0" i="1" smtClean="0">
+                          <a:latin typeface="Cambria Math" panose="02040503050406030204" pitchFamily="18" charset="0"/>
+                        </a:rPr>
+                        <m:t>𝐼</m:t>
+                      </m:r>
+                      <m:sSub>
+                        <m:sSubPr>
+                          <m:ctrlPr>
+                            <a:rPr lang="en-US" altLang="zh-CN" b="0" i="1" smtClean="0">
+                              <a:latin typeface="Cambria Math" panose="02040503050406030204" pitchFamily="18" charset="0"/>
+                            </a:rPr>
+                          </m:ctrlPr>
+                        </m:sSubPr>
+                        <m:e>
+                          <m:r>
+                            <a:rPr lang="en-US" altLang="zh-CN" b="0" i="1" smtClean="0">
+                              <a:latin typeface="Cambria Math" panose="02040503050406030204" pitchFamily="18" charset="0"/>
+                            </a:rPr>
+                            <m:t>𝐻𝑉</m:t>
+                          </m:r>
+                        </m:e>
+                        <m:sub>
+                          <m:r>
+                            <a:rPr lang="en-US" altLang="zh-CN" b="0" i="1" smtClean="0">
+                              <a:latin typeface="Cambria Math" panose="02040503050406030204" pitchFamily="18" charset="0"/>
+                            </a:rPr>
+                            <m:t>4</m:t>
+                          </m:r>
+                        </m:sub>
+                      </m:sSub>
+                    </m:oMath>
+                  </m:oMathPara>
+                </a14:m>
+                <a:endParaRPr lang="zh-CN" altLang="en-US" dirty="0"/>
+              </a:p>
+            </p:txBody>
+          </p:sp>
+        </mc:Choice>
+        <mc:Fallback xmlns="">
+          <p:sp>
+            <p:nvSpPr>
+              <p:cNvPr id="29" name="箭头: 右 28">
+                <a:extLst>
+                  <a:ext uri="{FF2B5EF4-FFF2-40B4-BE49-F238E27FC236}">
+                    <a16:creationId xmlns:a16="http://schemas.microsoft.com/office/drawing/2014/main" id="{B568228E-66A1-4D22-8B90-8B9885663673}"/>
+                  </a:ext>
+                </a:extLst>
+              </p:cNvPr>
+              <p:cNvSpPr>
+                <a:spLocks noRot="1" noChangeAspect="1" noMove="1" noResize="1" noEditPoints="1" noAdjustHandles="1" noChangeArrowheads="1" noChangeShapeType="1" noTextEdit="1"/>
+              </p:cNvSpPr>
+              <p:nvPr/>
+            </p:nvSpPr>
+            <p:spPr>
+              <a:xfrm>
+                <a:off x="9709233" y="3206910"/>
+                <a:ext cx="696409" cy="444178"/>
+              </a:xfrm>
+              <a:prstGeom prst="rightArrow">
+                <a:avLst/>
+              </a:prstGeom>
+              <a:blipFill>
+                <a:blip r:embed="rId14"/>
+                <a:stretch>
+                  <a:fillRect l="-6838"/>
+                </a:stretch>
+              </a:blipFill>
+            </p:spPr>
+            <p:txBody>
+              <a:bodyPr/>
+              <a:lstStyle/>
+              <a:p>
+                <a:r>
+                  <a:rPr lang="zh-CN" altLang="en-US">
+                    <a:noFill/>
+                  </a:rPr>
+                  <a:t> </a:t>
+                </a:r>
+              </a:p>
+            </p:txBody>
+          </p:sp>
+        </mc:Fallback>
+      </mc:AlternateContent>
+      <p:sp>
+        <p:nvSpPr>
+          <p:cNvPr id="30" name="文本框 29">
+            <a:extLst>
+              <a:ext uri="{FF2B5EF4-FFF2-40B4-BE49-F238E27FC236}">
+                <a16:creationId xmlns:a16="http://schemas.microsoft.com/office/drawing/2014/main" id="{1DDBB951-50BD-4B73-A3E3-BF41A63D9ACC}"/>
+              </a:ext>
+            </a:extLst>
+          </p:cNvPr>
+          <p:cNvSpPr txBox="1"/>
+          <p:nvPr/>
+        </p:nvSpPr>
+        <p:spPr>
+          <a:xfrm>
+            <a:off x="10650639" y="3281756"/>
+            <a:ext cx="902826" cy="369332"/>
+          </a:xfrm>
+          <a:prstGeom prst="rect">
+            <a:avLst/>
+          </a:prstGeom>
+          <a:noFill/>
+        </p:spPr>
+        <p:txBody>
+          <a:bodyPr wrap="square" rtlCol="0">
+            <a:spAutoFit/>
+          </a:bodyPr>
+          <a:lstStyle/>
+          <a:p>
+            <a:r>
+              <a:rPr lang="en-US" altLang="zh-CN" dirty="0"/>
+              <a:t>…</a:t>
+            </a:r>
+            <a:endParaRPr lang="zh-CN" altLang="en-US" dirty="0"/>
+          </a:p>
+        </p:txBody>
+      </p:sp>
+      <p:sp>
+        <p:nvSpPr>
+          <p:cNvPr id="31" name="文本框 30">
+            <a:extLst>
+              <a:ext uri="{FF2B5EF4-FFF2-40B4-BE49-F238E27FC236}">
+                <a16:creationId xmlns:a16="http://schemas.microsoft.com/office/drawing/2014/main" id="{F879661D-7C14-41A6-B733-30D624C15653}"/>
+              </a:ext>
+            </a:extLst>
+          </p:cNvPr>
+          <p:cNvSpPr txBox="1"/>
+          <p:nvPr/>
+        </p:nvSpPr>
+        <p:spPr>
+          <a:xfrm>
+            <a:off x="10650639" y="2025568"/>
+            <a:ext cx="902826" cy="369332"/>
+          </a:xfrm>
+          <a:prstGeom prst="rect">
+            <a:avLst/>
+          </a:prstGeom>
+          <a:noFill/>
+        </p:spPr>
+        <p:txBody>
+          <a:bodyPr wrap="square" rtlCol="0">
+            <a:spAutoFit/>
+          </a:bodyPr>
+          <a:lstStyle/>
+          <a:p>
+            <a:r>
+              <a:rPr lang="en-US" altLang="zh-CN" dirty="0"/>
+              <a:t>…</a:t>
+            </a:r>
+            <a:endParaRPr lang="zh-CN" altLang="en-US" dirty="0"/>
+          </a:p>
+        </p:txBody>
+      </p:sp>
+    </p:spTree>
+    <p:extLst>
+      <p:ext uri="{BB962C8B-B14F-4D97-AF65-F5344CB8AC3E}">
+        <p14:creationId xmlns:p14="http://schemas.microsoft.com/office/powerpoint/2010/main" val="1654661577"/>
       </p:ext>
     </p:extLst>
   </p:cSld>

</xml_diff>